<commit_message>
Updated PX-HER0 board pictures
</commit_message>
<xml_diff>
--- a/doc/images/hero_board/hero_board_bot_annotated.pptx
+++ b/doc/images/hero_board/hero_board_bot_annotated.pptx
@@ -261,7 +261,7 @@
           <a:p>
             <a:fld id="{A4A54569-7902-4945-B214-29C88B7567F2}" type="datetimeFigureOut">
               <a:rPr lang="en-ZA" smtClean="0"/>
-              <a:t>2019-03-02</a:t>
+              <a:t>2019/10/14</a:t>
             </a:fld>
             <a:endParaRPr lang="en-ZA"/>
           </a:p>
@@ -461,7 +461,7 @@
           <a:p>
             <a:fld id="{A4A54569-7902-4945-B214-29C88B7567F2}" type="datetimeFigureOut">
               <a:rPr lang="en-ZA" smtClean="0"/>
-              <a:t>2019-03-02</a:t>
+              <a:t>2019/10/14</a:t>
             </a:fld>
             <a:endParaRPr lang="en-ZA"/>
           </a:p>
@@ -671,7 +671,7 @@
           <a:p>
             <a:fld id="{A4A54569-7902-4945-B214-29C88B7567F2}" type="datetimeFigureOut">
               <a:rPr lang="en-ZA" smtClean="0"/>
-              <a:t>2019-03-02</a:t>
+              <a:t>2019/10/14</a:t>
             </a:fld>
             <a:endParaRPr lang="en-ZA"/>
           </a:p>
@@ -871,7 +871,7 @@
           <a:p>
             <a:fld id="{A4A54569-7902-4945-B214-29C88B7567F2}" type="datetimeFigureOut">
               <a:rPr lang="en-ZA" smtClean="0"/>
-              <a:t>2019-03-02</a:t>
+              <a:t>2019/10/14</a:t>
             </a:fld>
             <a:endParaRPr lang="en-ZA"/>
           </a:p>
@@ -1147,7 +1147,7 @@
           <a:p>
             <a:fld id="{A4A54569-7902-4945-B214-29C88B7567F2}" type="datetimeFigureOut">
               <a:rPr lang="en-ZA" smtClean="0"/>
-              <a:t>2019-03-02</a:t>
+              <a:t>2019/10/14</a:t>
             </a:fld>
             <a:endParaRPr lang="en-ZA"/>
           </a:p>
@@ -1415,7 +1415,7 @@
           <a:p>
             <a:fld id="{A4A54569-7902-4945-B214-29C88B7567F2}" type="datetimeFigureOut">
               <a:rPr lang="en-ZA" smtClean="0"/>
-              <a:t>2019-03-02</a:t>
+              <a:t>2019/10/14</a:t>
             </a:fld>
             <a:endParaRPr lang="en-ZA"/>
           </a:p>
@@ -1830,7 +1830,7 @@
           <a:p>
             <a:fld id="{A4A54569-7902-4945-B214-29C88B7567F2}" type="datetimeFigureOut">
               <a:rPr lang="en-ZA" smtClean="0"/>
-              <a:t>2019-03-02</a:t>
+              <a:t>2019/10/14</a:t>
             </a:fld>
             <a:endParaRPr lang="en-ZA"/>
           </a:p>
@@ -1972,7 +1972,7 @@
           <a:p>
             <a:fld id="{A4A54569-7902-4945-B214-29C88B7567F2}" type="datetimeFigureOut">
               <a:rPr lang="en-ZA" smtClean="0"/>
-              <a:t>2019-03-02</a:t>
+              <a:t>2019/10/14</a:t>
             </a:fld>
             <a:endParaRPr lang="en-ZA"/>
           </a:p>
@@ -2085,7 +2085,7 @@
           <a:p>
             <a:fld id="{A4A54569-7902-4945-B214-29C88B7567F2}" type="datetimeFigureOut">
               <a:rPr lang="en-ZA" smtClean="0"/>
-              <a:t>2019-03-02</a:t>
+              <a:t>2019/10/14</a:t>
             </a:fld>
             <a:endParaRPr lang="en-ZA"/>
           </a:p>
@@ -2398,7 +2398,7 @@
           <a:p>
             <a:fld id="{A4A54569-7902-4945-B214-29C88B7567F2}" type="datetimeFigureOut">
               <a:rPr lang="en-ZA" smtClean="0"/>
-              <a:t>2019-03-02</a:t>
+              <a:t>2019/10/14</a:t>
             </a:fld>
             <a:endParaRPr lang="en-ZA"/>
           </a:p>
@@ -2687,7 +2687,7 @@
           <a:p>
             <a:fld id="{A4A54569-7902-4945-B214-29C88B7567F2}" type="datetimeFigureOut">
               <a:rPr lang="en-ZA" smtClean="0"/>
-              <a:t>2019-03-02</a:t>
+              <a:t>2019/10/14</a:t>
             </a:fld>
             <a:endParaRPr lang="en-ZA"/>
           </a:p>
@@ -2930,7 +2930,7 @@
           <a:p>
             <a:fld id="{A4A54569-7902-4945-B214-29C88B7567F2}" type="datetimeFigureOut">
               <a:rPr lang="en-ZA" smtClean="0"/>
-              <a:t>2019-03-02</a:t>
+              <a:t>2019/10/14</a:t>
             </a:fld>
             <a:endParaRPr lang="en-ZA"/>
           </a:p>
@@ -3369,14 +3369,13 @@
               </a:ext>
             </a:extLst>
           </a:blip>
-          <a:stretch>
-            <a:fillRect/>
-          </a:stretch>
+          <a:srcRect/>
+          <a:stretch/>
         </p:blipFill>
         <p:spPr>
           <a:xfrm>
-            <a:off x="4650740" y="2288540"/>
-            <a:ext cx="2890520" cy="2280920"/>
+            <a:off x="4650740" y="2295566"/>
+            <a:ext cx="2890520" cy="2266868"/>
           </a:xfrm>
           <a:prstGeom prst="rect">
             <a:avLst/>
@@ -3578,7 +3577,7 @@
         <p:spPr>
           <a:xfrm>
             <a:off x="6137655" y="2156473"/>
-            <a:ext cx="192298" cy="192798"/>
+            <a:ext cx="220283" cy="188921"/>
           </a:xfrm>
           <a:prstGeom prst="straightConnector1">
             <a:avLst/>
@@ -4073,7 +4072,7 @@
                   <a:schemeClr val="tx1"/>
                 </a:solidFill>
               </a:rPr>
-              <a:t>SD Card</a:t>
+              <a:t>µSD card</a:t>
             </a:r>
           </a:p>
         </p:txBody>
@@ -4463,123 +4462,6 @@
           </a:fontRef>
         </p:style>
       </p:cxnSp>
-      <p:sp>
-        <p:nvSpPr>
-          <p:cNvPr id="29" name="Rectangle 28">
-            <a:extLst>
-              <a:ext uri="{FF2B5EF4-FFF2-40B4-BE49-F238E27FC236}">
-                <a16:creationId xmlns:a16="http://schemas.microsoft.com/office/drawing/2014/main" id="{28901FFF-D7D6-4D67-B052-C75375C71357}"/>
-              </a:ext>
-            </a:extLst>
-          </p:cNvPr>
-          <p:cNvSpPr/>
-          <p:nvPr/>
-        </p:nvSpPr>
-        <p:spPr>
-          <a:xfrm>
-            <a:off x="3348038" y="2971800"/>
-            <a:ext cx="1160462" cy="315913"/>
-          </a:xfrm>
-          <a:prstGeom prst="rect">
-            <a:avLst/>
-          </a:prstGeom>
-          <a:solidFill>
-            <a:srgbClr val="EFE5A3"/>
-          </a:solidFill>
-          <a:ln>
-            <a:solidFill>
-              <a:srgbClr val="C0A820"/>
-            </a:solidFill>
-          </a:ln>
-        </p:spPr>
-        <p:style>
-          <a:lnRef idx="2">
-            <a:schemeClr val="accent1">
-              <a:shade val="50000"/>
-            </a:schemeClr>
-          </a:lnRef>
-          <a:fillRef idx="1">
-            <a:schemeClr val="accent1"/>
-          </a:fillRef>
-          <a:effectRef idx="0">
-            <a:schemeClr val="accent1"/>
-          </a:effectRef>
-          <a:fontRef idx="minor">
-            <a:schemeClr val="lt1"/>
-          </a:fontRef>
-        </p:style>
-        <p:txBody>
-          <a:bodyPr rtlCol="0" anchor="ctr"/>
-          <a:lstStyle/>
-          <a:p>
-            <a:pPr algn="ctr"/>
-            <a:r>
-              <a:rPr lang="en-ZA" sz="1000" dirty="0">
-                <a:solidFill>
-                  <a:schemeClr val="tx1"/>
-                </a:solidFill>
-              </a:rPr>
-              <a:t>Power selection</a:t>
-            </a:r>
-          </a:p>
-          <a:p>
-            <a:pPr algn="ctr"/>
-            <a:r>
-              <a:rPr lang="en-ZA" sz="1000" dirty="0">
-                <a:solidFill>
-                  <a:schemeClr val="tx1"/>
-                </a:solidFill>
-              </a:rPr>
-              <a:t>(USB1 or USB2)</a:t>
-            </a:r>
-          </a:p>
-        </p:txBody>
-      </p:sp>
-      <p:cxnSp>
-        <p:nvCxnSpPr>
-          <p:cNvPr id="31" name="Straight Arrow Connector 30">
-            <a:extLst>
-              <a:ext uri="{FF2B5EF4-FFF2-40B4-BE49-F238E27FC236}">
-                <a16:creationId xmlns:a16="http://schemas.microsoft.com/office/drawing/2014/main" id="{6EBACE0E-9B0D-41F1-8658-E3DB946C74ED}"/>
-              </a:ext>
-            </a:extLst>
-          </p:cNvPr>
-          <p:cNvCxnSpPr>
-            <a:cxnSpLocks/>
-            <a:stCxn id="29" idx="3"/>
-          </p:cNvCxnSpPr>
-          <p:nvPr/>
-        </p:nvCxnSpPr>
-        <p:spPr>
-          <a:xfrm>
-            <a:off x="4508500" y="3129757"/>
-            <a:ext cx="220663" cy="21193"/>
-          </a:xfrm>
-          <a:prstGeom prst="straightConnector1">
-            <a:avLst/>
-          </a:prstGeom>
-          <a:ln w="12700">
-            <a:solidFill>
-              <a:srgbClr val="C0A820"/>
-            </a:solidFill>
-            <a:tailEnd type="triangle"/>
-          </a:ln>
-        </p:spPr>
-        <p:style>
-          <a:lnRef idx="1">
-            <a:schemeClr val="accent1"/>
-          </a:lnRef>
-          <a:fillRef idx="0">
-            <a:schemeClr val="accent1"/>
-          </a:fillRef>
-          <a:effectRef idx="0">
-            <a:schemeClr val="accent1"/>
-          </a:effectRef>
-          <a:fontRef idx="minor">
-            <a:schemeClr val="tx1"/>
-          </a:fontRef>
-        </p:style>
-      </p:cxnSp>
       <p:cxnSp>
         <p:nvCxnSpPr>
           <p:cNvPr id="34" name="Straight Arrow Connector 33">
@@ -4911,7 +4793,7 @@
         <p:spPr>
           <a:xfrm>
             <a:off x="4508500" y="2164585"/>
-            <a:ext cx="982327" cy="828409"/>
+            <a:ext cx="920750" cy="807215"/>
           </a:xfrm>
           <a:prstGeom prst="straightConnector1">
             <a:avLst/>
@@ -4955,7 +4837,7 @@
         <p:spPr>
           <a:xfrm>
             <a:off x="5382936" y="2164585"/>
-            <a:ext cx="604322" cy="354778"/>
+            <a:ext cx="604322" cy="316678"/>
           </a:xfrm>
           <a:prstGeom prst="straightConnector1">
             <a:avLst/>
@@ -5000,7 +4882,7 @@
         <p:spPr>
           <a:xfrm>
             <a:off x="6741977" y="2164584"/>
-            <a:ext cx="63199" cy="180810"/>
+            <a:ext cx="4898" cy="130982"/>
           </a:xfrm>
           <a:prstGeom prst="straightConnector1">
             <a:avLst/>
@@ -5043,8 +4925,8 @@
         </p:nvCxnSpPr>
         <p:spPr>
           <a:xfrm flipH="1">
-            <a:off x="7208861" y="2149889"/>
-            <a:ext cx="134348" cy="199382"/>
+            <a:off x="7248525" y="2149889"/>
+            <a:ext cx="94684" cy="145677"/>
           </a:xfrm>
           <a:prstGeom prst="straightConnector1">
             <a:avLst/>

</xml_diff>

<commit_message>
Renamed px_circ_buffer to px_ring_buffer
</commit_message>
<xml_diff>
--- a/doc/images/hero_board/hero_board_bot_annotated.pptx
+++ b/doc/images/hero_board/hero_board_bot_annotated.pptx
@@ -261,7 +261,7 @@
           <a:p>
             <a:fld id="{A4A54569-7902-4945-B214-29C88B7567F2}" type="datetimeFigureOut">
               <a:rPr lang="en-ZA" smtClean="0"/>
-              <a:t>2019/10/14</a:t>
+              <a:t>2019-11-06</a:t>
             </a:fld>
             <a:endParaRPr lang="en-ZA"/>
           </a:p>
@@ -461,7 +461,7 @@
           <a:p>
             <a:fld id="{A4A54569-7902-4945-B214-29C88B7567F2}" type="datetimeFigureOut">
               <a:rPr lang="en-ZA" smtClean="0"/>
-              <a:t>2019/10/14</a:t>
+              <a:t>2019-11-06</a:t>
             </a:fld>
             <a:endParaRPr lang="en-ZA"/>
           </a:p>
@@ -671,7 +671,7 @@
           <a:p>
             <a:fld id="{A4A54569-7902-4945-B214-29C88B7567F2}" type="datetimeFigureOut">
               <a:rPr lang="en-ZA" smtClean="0"/>
-              <a:t>2019/10/14</a:t>
+              <a:t>2019-11-06</a:t>
             </a:fld>
             <a:endParaRPr lang="en-ZA"/>
           </a:p>
@@ -871,7 +871,7 @@
           <a:p>
             <a:fld id="{A4A54569-7902-4945-B214-29C88B7567F2}" type="datetimeFigureOut">
               <a:rPr lang="en-ZA" smtClean="0"/>
-              <a:t>2019/10/14</a:t>
+              <a:t>2019-11-06</a:t>
             </a:fld>
             <a:endParaRPr lang="en-ZA"/>
           </a:p>
@@ -1147,7 +1147,7 @@
           <a:p>
             <a:fld id="{A4A54569-7902-4945-B214-29C88B7567F2}" type="datetimeFigureOut">
               <a:rPr lang="en-ZA" smtClean="0"/>
-              <a:t>2019/10/14</a:t>
+              <a:t>2019-11-06</a:t>
             </a:fld>
             <a:endParaRPr lang="en-ZA"/>
           </a:p>
@@ -1415,7 +1415,7 @@
           <a:p>
             <a:fld id="{A4A54569-7902-4945-B214-29C88B7567F2}" type="datetimeFigureOut">
               <a:rPr lang="en-ZA" smtClean="0"/>
-              <a:t>2019/10/14</a:t>
+              <a:t>2019-11-06</a:t>
             </a:fld>
             <a:endParaRPr lang="en-ZA"/>
           </a:p>
@@ -1830,7 +1830,7 @@
           <a:p>
             <a:fld id="{A4A54569-7902-4945-B214-29C88B7567F2}" type="datetimeFigureOut">
               <a:rPr lang="en-ZA" smtClean="0"/>
-              <a:t>2019/10/14</a:t>
+              <a:t>2019-11-06</a:t>
             </a:fld>
             <a:endParaRPr lang="en-ZA"/>
           </a:p>
@@ -1972,7 +1972,7 @@
           <a:p>
             <a:fld id="{A4A54569-7902-4945-B214-29C88B7567F2}" type="datetimeFigureOut">
               <a:rPr lang="en-ZA" smtClean="0"/>
-              <a:t>2019/10/14</a:t>
+              <a:t>2019-11-06</a:t>
             </a:fld>
             <a:endParaRPr lang="en-ZA"/>
           </a:p>
@@ -2085,7 +2085,7 @@
           <a:p>
             <a:fld id="{A4A54569-7902-4945-B214-29C88B7567F2}" type="datetimeFigureOut">
               <a:rPr lang="en-ZA" smtClean="0"/>
-              <a:t>2019/10/14</a:t>
+              <a:t>2019-11-06</a:t>
             </a:fld>
             <a:endParaRPr lang="en-ZA"/>
           </a:p>
@@ -2398,7 +2398,7 @@
           <a:p>
             <a:fld id="{A4A54569-7902-4945-B214-29C88B7567F2}" type="datetimeFigureOut">
               <a:rPr lang="en-ZA" smtClean="0"/>
-              <a:t>2019/10/14</a:t>
+              <a:t>2019-11-06</a:t>
             </a:fld>
             <a:endParaRPr lang="en-ZA"/>
           </a:p>
@@ -2687,7 +2687,7 @@
           <a:p>
             <a:fld id="{A4A54569-7902-4945-B214-29C88B7567F2}" type="datetimeFigureOut">
               <a:rPr lang="en-ZA" smtClean="0"/>
-              <a:t>2019/10/14</a:t>
+              <a:t>2019-11-06</a:t>
             </a:fld>
             <a:endParaRPr lang="en-ZA"/>
           </a:p>
@@ -2930,7 +2930,7 @@
           <a:p>
             <a:fld id="{A4A54569-7902-4945-B214-29C88B7567F2}" type="datetimeFigureOut">
               <a:rPr lang="en-ZA" smtClean="0"/>
-              <a:t>2019/10/14</a:t>
+              <a:t>2019-11-06</a:t>
             </a:fld>
             <a:endParaRPr lang="en-ZA"/>
           </a:p>
@@ -3449,7 +3449,7 @@
                   <a:schemeClr val="tx1"/>
                 </a:solidFill>
               </a:rPr>
-              <a:t>Battery connector</a:t>
+              <a:t>battery connector</a:t>
             </a:r>
           </a:p>
         </p:txBody>
@@ -3519,9 +3519,7 @@
           <a:prstGeom prst="rect">
             <a:avLst/>
           </a:prstGeom>
-          <a:solidFill>
-            <a:srgbClr val="EFE5A3"/>
-          </a:solidFill>
+          <a:noFill/>
           <a:ln>
             <a:solidFill>
               <a:srgbClr val="C0A820"/>
@@ -3669,7 +3667,7 @@
                   <a:schemeClr val="tx1"/>
                 </a:solidFill>
               </a:rPr>
-              <a:t>Selection</a:t>
+              <a:t>selection</a:t>
             </a:r>
           </a:p>
         </p:txBody>
@@ -3739,7 +3737,7 @@
                   <a:schemeClr val="tx1"/>
                 </a:solidFill>
               </a:rPr>
-              <a:t>Connector</a:t>
+              <a:t>connector</a:t>
             </a:r>
           </a:p>
         </p:txBody>
@@ -3798,7 +3796,7 @@
                   <a:schemeClr val="tx1"/>
                 </a:solidFill>
               </a:rPr>
-              <a:t>Reset Button</a:t>
+              <a:t>Reset button</a:t>
             </a:r>
           </a:p>
         </p:txBody>
@@ -3856,7 +3854,7 @@
                   <a:schemeClr val="tx1"/>
                 </a:solidFill>
               </a:rPr>
-              <a:t>Peripheral Connector:</a:t>
+              <a:t>Peripheral connector:</a:t>
             </a:r>
           </a:p>
           <a:p>
@@ -3973,7 +3971,7 @@
         </p:nvSpPr>
         <p:spPr>
           <a:xfrm>
-            <a:off x="5304635" y="4700599"/>
+            <a:off x="5034978" y="4708111"/>
             <a:ext cx="682623" cy="292735"/>
           </a:xfrm>
           <a:prstGeom prst="rect">
@@ -4233,7 +4231,7 @@
         </p:nvSpPr>
         <p:spPr>
           <a:xfrm>
-            <a:off x="6823869" y="4700599"/>
+            <a:off x="7106297" y="4705168"/>
             <a:ext cx="786934" cy="292727"/>
           </a:xfrm>
           <a:prstGeom prst="rect">
@@ -4268,13 +4266,18 @@
           <a:p>
             <a:pPr algn="ctr"/>
             <a:r>
-              <a:rPr lang="en-ZA" sz="1000" dirty="0">
+              <a:rPr lang="en-ZA" sz="1000" dirty="0" err="1">
                 <a:solidFill>
                   <a:schemeClr val="tx1"/>
                 </a:solidFill>
               </a:rPr>
-              <a:t>seeed</a:t>
-            </a:r>
+              <a:t>Seeed</a:t>
+            </a:r>
+            <a:endParaRPr lang="en-ZA" sz="1000" dirty="0">
+              <a:solidFill>
+                <a:schemeClr val="tx1"/>
+              </a:solidFill>
+            </a:endParaRPr>
           </a:p>
           <a:p>
             <a:pPr algn="ctr"/>
@@ -4303,8 +4306,8 @@
         </p:nvSpPr>
         <p:spPr>
           <a:xfrm>
-            <a:off x="6064252" y="4700599"/>
-            <a:ext cx="682623" cy="292735"/>
+            <a:off x="5889624" y="4707554"/>
+            <a:ext cx="1042861" cy="292728"/>
           </a:xfrm>
           <a:prstGeom prst="rect">
             <a:avLst/>
@@ -4338,13 +4341,34 @@
           <a:p>
             <a:pPr algn="ctr"/>
             <a:r>
+              <a:rPr lang="en-ZA" sz="1000" dirty="0" err="1">
+                <a:solidFill>
+                  <a:schemeClr val="tx1"/>
+                </a:solidFill>
+              </a:rPr>
+              <a:t>Sparkfun</a:t>
+            </a:r>
+            <a:r>
               <a:rPr lang="en-ZA" sz="1000" dirty="0">
                 <a:solidFill>
                   <a:schemeClr val="tx1"/>
                 </a:solidFill>
               </a:rPr>
-              <a:t>sparkfun</a:t>
-            </a:r>
+              <a:t> </a:t>
+            </a:r>
+            <a:r>
+              <a:rPr lang="en-ZA" sz="1000" dirty="0" err="1">
+                <a:solidFill>
+                  <a:schemeClr val="tx1"/>
+                </a:solidFill>
+              </a:rPr>
+              <a:t>Qwiic</a:t>
+            </a:r>
+            <a:endParaRPr lang="en-ZA" sz="1000" dirty="0">
+              <a:solidFill>
+                <a:schemeClr val="tx1"/>
+              </a:solidFill>
+            </a:endParaRPr>
           </a:p>
           <a:p>
             <a:pPr algn="ctr"/>
@@ -4354,7 +4378,7 @@
                   <a:schemeClr val="tx1"/>
                 </a:solidFill>
               </a:rPr>
-              <a:t>QWICC</a:t>
+              <a:t>STEMMA QT</a:t>
             </a:r>
           </a:p>
         </p:txBody>
@@ -4607,14 +4631,13 @@
           </p:cNvPr>
           <p:cNvCxnSpPr>
             <a:cxnSpLocks/>
-            <a:endCxn id="5" idx="2"/>
           </p:cNvCxnSpPr>
           <p:nvPr/>
         </p:nvCxnSpPr>
         <p:spPr>
           <a:xfrm flipV="1">
-            <a:off x="5987258" y="4569460"/>
-            <a:ext cx="108742" cy="131140"/>
+            <a:off x="5715812" y="4562435"/>
+            <a:ext cx="231759" cy="145676"/>
           </a:xfrm>
           <a:prstGeom prst="straightConnector1">
             <a:avLst/>
@@ -4658,8 +4681,8 @@
         </p:nvCxnSpPr>
         <p:spPr>
           <a:xfrm flipV="1">
-            <a:off x="6405564" y="4543425"/>
-            <a:ext cx="93661" cy="157174"/>
+            <a:off x="6411055" y="4550380"/>
+            <a:ext cx="95440" cy="157174"/>
           </a:xfrm>
           <a:prstGeom prst="straightConnector1">
             <a:avLst/>
@@ -4697,14 +4720,13 @@
           </p:cNvPr>
           <p:cNvCxnSpPr>
             <a:cxnSpLocks/>
-            <a:stCxn id="20" idx="0"/>
           </p:cNvCxnSpPr>
           <p:nvPr/>
         </p:nvCxnSpPr>
         <p:spPr>
           <a:xfrm flipH="1" flipV="1">
-            <a:off x="6948490" y="4543425"/>
-            <a:ext cx="268846" cy="157174"/>
+            <a:off x="6925217" y="4552931"/>
+            <a:ext cx="181080" cy="155180"/>
           </a:xfrm>
           <a:prstGeom prst="straightConnector1">
             <a:avLst/>
@@ -4748,8 +4770,8 @@
         </p:nvCxnSpPr>
         <p:spPr>
           <a:xfrm flipH="1">
-            <a:off x="6900863" y="2546504"/>
-            <a:ext cx="738515" cy="147899"/>
+            <a:off x="6900864" y="2518813"/>
+            <a:ext cx="738514" cy="175590"/>
           </a:xfrm>
           <a:prstGeom prst="straightConnector1">
             <a:avLst/>
@@ -4967,8 +4989,8 @@
         </p:nvSpPr>
         <p:spPr>
           <a:xfrm>
-            <a:off x="7639378" y="2306675"/>
-            <a:ext cx="947410" cy="479657"/>
+            <a:off x="7639378" y="2218925"/>
+            <a:ext cx="947410" cy="599776"/>
           </a:xfrm>
           <a:prstGeom prst="rect">
             <a:avLst/>
@@ -5007,7 +5029,7 @@
                   <a:schemeClr val="tx1"/>
                 </a:solidFill>
               </a:rPr>
-              <a:t>Standard ARM Cortex Debug</a:t>
+              <a:t>Standard ARM Cortex debug</a:t>
             </a:r>
           </a:p>
           <a:p>
@@ -5018,7 +5040,7 @@
                   <a:schemeClr val="tx1"/>
                 </a:solidFill>
               </a:rPr>
-              <a:t>Connector</a:t>
+              <a:t>connector footprint</a:t>
             </a:r>
           </a:p>
         </p:txBody>

</xml_diff>

<commit_message>
Updated PX-HER0 board images
</commit_message>
<xml_diff>
--- a/doc/images/hero_board/hero_board_bot_annotated.pptx
+++ b/doc/images/hero_board/hero_board_bot_annotated.pptx
@@ -261,7 +261,7 @@
           <a:p>
             <a:fld id="{A4A54569-7902-4945-B214-29C88B7567F2}" type="datetimeFigureOut">
               <a:rPr lang="en-ZA" smtClean="0"/>
-              <a:t>2019-11-20</a:t>
+              <a:t>2019-11-28</a:t>
             </a:fld>
             <a:endParaRPr lang="en-ZA"/>
           </a:p>
@@ -461,7 +461,7 @@
           <a:p>
             <a:fld id="{A4A54569-7902-4945-B214-29C88B7567F2}" type="datetimeFigureOut">
               <a:rPr lang="en-ZA" smtClean="0"/>
-              <a:t>2019-11-20</a:t>
+              <a:t>2019-11-28</a:t>
             </a:fld>
             <a:endParaRPr lang="en-ZA"/>
           </a:p>
@@ -671,7 +671,7 @@
           <a:p>
             <a:fld id="{A4A54569-7902-4945-B214-29C88B7567F2}" type="datetimeFigureOut">
               <a:rPr lang="en-ZA" smtClean="0"/>
-              <a:t>2019-11-20</a:t>
+              <a:t>2019-11-28</a:t>
             </a:fld>
             <a:endParaRPr lang="en-ZA"/>
           </a:p>
@@ -871,7 +871,7 @@
           <a:p>
             <a:fld id="{A4A54569-7902-4945-B214-29C88B7567F2}" type="datetimeFigureOut">
               <a:rPr lang="en-ZA" smtClean="0"/>
-              <a:t>2019-11-20</a:t>
+              <a:t>2019-11-28</a:t>
             </a:fld>
             <a:endParaRPr lang="en-ZA"/>
           </a:p>
@@ -1147,7 +1147,7 @@
           <a:p>
             <a:fld id="{A4A54569-7902-4945-B214-29C88B7567F2}" type="datetimeFigureOut">
               <a:rPr lang="en-ZA" smtClean="0"/>
-              <a:t>2019-11-20</a:t>
+              <a:t>2019-11-28</a:t>
             </a:fld>
             <a:endParaRPr lang="en-ZA"/>
           </a:p>
@@ -1415,7 +1415,7 @@
           <a:p>
             <a:fld id="{A4A54569-7902-4945-B214-29C88B7567F2}" type="datetimeFigureOut">
               <a:rPr lang="en-ZA" smtClean="0"/>
-              <a:t>2019-11-20</a:t>
+              <a:t>2019-11-28</a:t>
             </a:fld>
             <a:endParaRPr lang="en-ZA"/>
           </a:p>
@@ -1830,7 +1830,7 @@
           <a:p>
             <a:fld id="{A4A54569-7902-4945-B214-29C88B7567F2}" type="datetimeFigureOut">
               <a:rPr lang="en-ZA" smtClean="0"/>
-              <a:t>2019-11-20</a:t>
+              <a:t>2019-11-28</a:t>
             </a:fld>
             <a:endParaRPr lang="en-ZA"/>
           </a:p>
@@ -1972,7 +1972,7 @@
           <a:p>
             <a:fld id="{A4A54569-7902-4945-B214-29C88B7567F2}" type="datetimeFigureOut">
               <a:rPr lang="en-ZA" smtClean="0"/>
-              <a:t>2019-11-20</a:t>
+              <a:t>2019-11-28</a:t>
             </a:fld>
             <a:endParaRPr lang="en-ZA"/>
           </a:p>
@@ -2085,7 +2085,7 @@
           <a:p>
             <a:fld id="{A4A54569-7902-4945-B214-29C88B7567F2}" type="datetimeFigureOut">
               <a:rPr lang="en-ZA" smtClean="0"/>
-              <a:t>2019-11-20</a:t>
+              <a:t>2019-11-28</a:t>
             </a:fld>
             <a:endParaRPr lang="en-ZA"/>
           </a:p>
@@ -2398,7 +2398,7 @@
           <a:p>
             <a:fld id="{A4A54569-7902-4945-B214-29C88B7567F2}" type="datetimeFigureOut">
               <a:rPr lang="en-ZA" smtClean="0"/>
-              <a:t>2019-11-20</a:t>
+              <a:t>2019-11-28</a:t>
             </a:fld>
             <a:endParaRPr lang="en-ZA"/>
           </a:p>
@@ -2687,7 +2687,7 @@
           <a:p>
             <a:fld id="{A4A54569-7902-4945-B214-29C88B7567F2}" type="datetimeFigureOut">
               <a:rPr lang="en-ZA" smtClean="0"/>
-              <a:t>2019-11-20</a:t>
+              <a:t>2019-11-28</a:t>
             </a:fld>
             <a:endParaRPr lang="en-ZA"/>
           </a:p>
@@ -2930,7 +2930,7 @@
           <a:p>
             <a:fld id="{A4A54569-7902-4945-B214-29C88B7567F2}" type="datetimeFigureOut">
               <a:rPr lang="en-ZA" smtClean="0"/>
-              <a:t>2019-11-20</a:t>
+              <a:t>2019-11-28</a:t>
             </a:fld>
             <a:endParaRPr lang="en-ZA"/>
           </a:p>
@@ -3396,8 +3396,8 @@
         </p:nvSpPr>
         <p:spPr>
           <a:xfrm>
-            <a:off x="3348038" y="2546504"/>
-            <a:ext cx="1160462" cy="343064"/>
+            <a:off x="3476304" y="2546504"/>
+            <a:ext cx="1032196" cy="343064"/>
           </a:xfrm>
           <a:prstGeom prst="rect">
             <a:avLst/>
@@ -3433,10 +3433,12 @@
           <a:p>
             <a:pPr algn="ctr"/>
             <a:r>
-              <a:rPr lang="en-ZA" sz="1000" dirty="0">
+              <a:rPr lang="en-ZA" sz="800" dirty="0">
                 <a:solidFill>
                   <a:schemeClr val="tx1"/>
                 </a:solidFill>
+                <a:latin typeface="Segoe UI" panose="020B0502040204020203" pitchFamily="34" charset="0"/>
+                <a:cs typeface="Segoe UI" panose="020B0502040204020203" pitchFamily="34" charset="0"/>
               </a:rPr>
               <a:t>Li-Po </a:t>
             </a:r>
@@ -3444,10 +3446,12 @@
           <a:p>
             <a:pPr algn="ctr"/>
             <a:r>
-              <a:rPr lang="en-ZA" sz="1000" dirty="0">
+              <a:rPr lang="en-ZA" sz="800" dirty="0">
                 <a:solidFill>
                   <a:schemeClr val="tx1"/>
                 </a:solidFill>
+                <a:latin typeface="Segoe UI" panose="020B0502040204020203" pitchFamily="34" charset="0"/>
+                <a:cs typeface="Segoe UI" panose="020B0502040204020203" pitchFamily="34" charset="0"/>
               </a:rPr>
               <a:t>battery connector</a:t>
             </a:r>
@@ -3513,8 +3517,8 @@
         </p:nvSpPr>
         <p:spPr>
           <a:xfrm>
-            <a:off x="4609823" y="1764955"/>
-            <a:ext cx="773113" cy="399629"/>
+            <a:off x="4609823" y="1863738"/>
+            <a:ext cx="773113" cy="300846"/>
           </a:xfrm>
           <a:prstGeom prst="rect">
             <a:avLst/>
@@ -3548,10 +3552,12 @@
           <a:p>
             <a:pPr algn="ctr"/>
             <a:r>
-              <a:rPr lang="en-ZA" sz="1000" dirty="0">
+              <a:rPr lang="en-ZA" sz="800" dirty="0">
                 <a:solidFill>
                   <a:schemeClr val="tx1"/>
                 </a:solidFill>
+                <a:latin typeface="Segoe UI" panose="020B0502040204020203" pitchFamily="34" charset="0"/>
+                <a:cs typeface="Segoe UI" panose="020B0502040204020203" pitchFamily="34" charset="0"/>
               </a:rPr>
               <a:t>Serial Flash</a:t>
             </a:r>
@@ -3616,8 +3622,8 @@
         </p:nvSpPr>
         <p:spPr>
           <a:xfrm>
-            <a:off x="5469319" y="1764956"/>
-            <a:ext cx="668336" cy="399628"/>
+            <a:off x="5469319" y="1863738"/>
+            <a:ext cx="668336" cy="300846"/>
           </a:xfrm>
           <a:prstGeom prst="rect">
             <a:avLst/>
@@ -3651,10 +3657,12 @@
           <a:p>
             <a:pPr algn="ctr"/>
             <a:r>
-              <a:rPr lang="en-ZA" sz="1000" dirty="0">
+              <a:rPr lang="en-ZA" sz="800" dirty="0">
                 <a:solidFill>
                   <a:schemeClr val="tx1"/>
                 </a:solidFill>
+                <a:latin typeface="Segoe UI" panose="020B0502040204020203" pitchFamily="34" charset="0"/>
+                <a:cs typeface="Segoe UI" panose="020B0502040204020203" pitchFamily="34" charset="0"/>
               </a:rPr>
               <a:t>BOOT</a:t>
             </a:r>
@@ -3662,10 +3670,12 @@
           <a:p>
             <a:pPr algn="ctr"/>
             <a:r>
-              <a:rPr lang="en-ZA" sz="1000" dirty="0">
+              <a:rPr lang="en-ZA" sz="800" dirty="0">
                 <a:solidFill>
                   <a:schemeClr val="tx1"/>
                 </a:solidFill>
+                <a:latin typeface="Segoe UI" panose="020B0502040204020203" pitchFamily="34" charset="0"/>
+                <a:cs typeface="Segoe UI" panose="020B0502040204020203" pitchFamily="34" charset="0"/>
               </a:rPr>
               <a:t>selection</a:t>
             </a:r>
@@ -3686,8 +3696,8 @@
         </p:nvSpPr>
         <p:spPr>
           <a:xfrm>
-            <a:off x="6271998" y="1764956"/>
-            <a:ext cx="939958" cy="399628"/>
+            <a:off x="6271998" y="1863744"/>
+            <a:ext cx="939958" cy="300839"/>
           </a:xfrm>
           <a:prstGeom prst="rect">
             <a:avLst/>
@@ -3721,10 +3731,12 @@
           <a:p>
             <a:pPr algn="ctr"/>
             <a:r>
-              <a:rPr lang="en-ZA" sz="1000" dirty="0">
+              <a:rPr lang="en-ZA" sz="800" dirty="0">
                 <a:solidFill>
                   <a:schemeClr val="tx1"/>
                 </a:solidFill>
+                <a:latin typeface="Segoe UI" panose="020B0502040204020203" pitchFamily="34" charset="0"/>
+                <a:cs typeface="Segoe UI" panose="020B0502040204020203" pitchFamily="34" charset="0"/>
               </a:rPr>
               <a:t>Prog &amp; Debug</a:t>
             </a:r>
@@ -3732,10 +3744,12 @@
           <a:p>
             <a:pPr algn="ctr"/>
             <a:r>
-              <a:rPr lang="en-ZA" sz="1000" dirty="0">
+              <a:rPr lang="en-ZA" sz="800" dirty="0">
                 <a:solidFill>
                   <a:schemeClr val="tx1"/>
                 </a:solidFill>
+                <a:latin typeface="Segoe UI" panose="020B0502040204020203" pitchFamily="34" charset="0"/>
+                <a:cs typeface="Segoe UI" panose="020B0502040204020203" pitchFamily="34" charset="0"/>
               </a:rPr>
               <a:t>connector</a:t>
             </a:r>
@@ -3756,8 +3770,8 @@
         </p:nvSpPr>
         <p:spPr>
           <a:xfrm>
-            <a:off x="7343209" y="1764956"/>
-            <a:ext cx="555397" cy="399628"/>
+            <a:off x="7343209" y="1863744"/>
+            <a:ext cx="555397" cy="300840"/>
           </a:xfrm>
           <a:prstGeom prst="rect">
             <a:avLst/>
@@ -3791,10 +3805,12 @@
           <a:p>
             <a:pPr algn="ctr"/>
             <a:r>
-              <a:rPr lang="en-ZA" sz="1000" dirty="0">
+              <a:rPr lang="en-ZA" sz="800" dirty="0">
                 <a:solidFill>
                   <a:schemeClr val="tx1"/>
                 </a:solidFill>
+                <a:latin typeface="Segoe UI" panose="020B0502040204020203" pitchFamily="34" charset="0"/>
+                <a:cs typeface="Segoe UI" panose="020B0502040204020203" pitchFamily="34" charset="0"/>
               </a:rPr>
               <a:t>Reset button</a:t>
             </a:r>
@@ -3815,8 +3831,8 @@
         </p:nvSpPr>
         <p:spPr>
           <a:xfrm>
-            <a:off x="7639377" y="2905997"/>
-            <a:ext cx="947409" cy="1637425"/>
+            <a:off x="7639378" y="2905998"/>
+            <a:ext cx="1266498" cy="1043062"/>
           </a:xfrm>
           <a:prstGeom prst="rect">
             <a:avLst/>
@@ -3849,12 +3865,14 @@
           <a:lstStyle/>
           <a:p>
             <a:r>
-              <a:rPr lang="en-ZA" sz="1000" dirty="0">
+              <a:rPr lang="en-ZA" sz="800" b="1" dirty="0">
                 <a:solidFill>
                   <a:schemeClr val="tx1"/>
                 </a:solidFill>
+                <a:latin typeface="Segoe UI" panose="020B0502040204020203" pitchFamily="34" charset="0"/>
+                <a:cs typeface="Segoe UI" panose="020B0502040204020203" pitchFamily="34" charset="0"/>
               </a:rPr>
-              <a:t>Peripheral connector:</a:t>
+              <a:t>Peripheral connector</a:t>
             </a:r>
           </a:p>
           <a:p>
@@ -3863,10 +3881,12 @@
               <a:buChar char="•"/>
             </a:pPr>
             <a:r>
-              <a:rPr lang="en-ZA" sz="1000" dirty="0">
+              <a:rPr lang="en-ZA" sz="800" dirty="0">
                 <a:solidFill>
                   <a:schemeClr val="tx1"/>
                 </a:solidFill>
+                <a:latin typeface="Segoe UI" panose="020B0502040204020203" pitchFamily="34" charset="0"/>
+                <a:cs typeface="Segoe UI" panose="020B0502040204020203" pitchFamily="34" charset="0"/>
               </a:rPr>
               <a:t>PWR</a:t>
             </a:r>
@@ -3877,10 +3897,12 @@
               <a:buChar char="•"/>
             </a:pPr>
             <a:r>
-              <a:rPr lang="en-ZA" sz="1000" dirty="0">
+              <a:rPr lang="en-ZA" sz="800" dirty="0">
                 <a:solidFill>
                   <a:schemeClr val="tx1"/>
                 </a:solidFill>
+                <a:latin typeface="Segoe UI" panose="020B0502040204020203" pitchFamily="34" charset="0"/>
+                <a:cs typeface="Segoe UI" panose="020B0502040204020203" pitchFamily="34" charset="0"/>
               </a:rPr>
               <a:t>ADC x 4</a:t>
             </a:r>
@@ -3891,10 +3913,12 @@
               <a:buChar char="•"/>
             </a:pPr>
             <a:r>
-              <a:rPr lang="en-ZA" sz="1000" dirty="0">
+              <a:rPr lang="en-ZA" sz="800" dirty="0">
                 <a:solidFill>
                   <a:schemeClr val="tx1"/>
                 </a:solidFill>
+                <a:latin typeface="Segoe UI" panose="020B0502040204020203" pitchFamily="34" charset="0"/>
+                <a:cs typeface="Segoe UI" panose="020B0502040204020203" pitchFamily="34" charset="0"/>
               </a:rPr>
               <a:t>DAC x 1</a:t>
             </a:r>
@@ -3905,12 +3929,14 @@
               <a:buChar char="•"/>
             </a:pPr>
             <a:r>
-              <a:rPr lang="en-ZA" sz="1000" dirty="0">
+              <a:rPr lang="en-ZA" sz="800" dirty="0">
                 <a:solidFill>
                   <a:schemeClr val="tx1"/>
                 </a:solidFill>
+                <a:latin typeface="Segoe UI" panose="020B0502040204020203" pitchFamily="34" charset="0"/>
+                <a:cs typeface="Segoe UI" panose="020B0502040204020203" pitchFamily="34" charset="0"/>
               </a:rPr>
-              <a:t>GPIO x 8</a:t>
+              <a:t>GPIO x 8 / PWM x 4</a:t>
             </a:r>
           </a:p>
           <a:p>
@@ -3919,12 +3945,14 @@
               <a:buChar char="•"/>
             </a:pPr>
             <a:r>
-              <a:rPr lang="en-ZA" sz="1000" dirty="0">
+              <a:rPr lang="en-ZA" sz="800" dirty="0">
                 <a:solidFill>
                   <a:schemeClr val="tx1"/>
                 </a:solidFill>
+                <a:latin typeface="Segoe UI" panose="020B0502040204020203" pitchFamily="34" charset="0"/>
+                <a:cs typeface="Segoe UI" panose="020B0502040204020203" pitchFamily="34" charset="0"/>
               </a:rPr>
-              <a:t>PWM x 4</a:t>
+              <a:t>UART x 2</a:t>
             </a:r>
           </a:p>
           <a:p>
@@ -3933,12 +3961,14 @@
               <a:buChar char="•"/>
             </a:pPr>
             <a:r>
-              <a:rPr lang="en-ZA" sz="1000" dirty="0">
+              <a:rPr lang="en-ZA" sz="800" dirty="0">
                 <a:solidFill>
                   <a:schemeClr val="tx1"/>
                 </a:solidFill>
+                <a:latin typeface="Segoe UI" panose="020B0502040204020203" pitchFamily="34" charset="0"/>
+                <a:cs typeface="Segoe UI" panose="020B0502040204020203" pitchFamily="34" charset="0"/>
               </a:rPr>
-              <a:t>UART x 2</a:t>
+              <a:t>I2C x 1</a:t>
             </a:r>
           </a:p>
           <a:p>
@@ -3947,24 +3977,12 @@
               <a:buChar char="•"/>
             </a:pPr>
             <a:r>
-              <a:rPr lang="en-ZA" sz="1000" dirty="0">
+              <a:rPr lang="en-ZA" sz="800" dirty="0">
                 <a:solidFill>
                   <a:schemeClr val="tx1"/>
                 </a:solidFill>
-              </a:rPr>
-              <a:t>I2C x 1</a:t>
-            </a:r>
-          </a:p>
-          <a:p>
-            <a:pPr marL="171450" indent="-171450">
-              <a:buFont typeface="Arial" panose="020B0604020202020204" pitchFamily="34" charset="0"/>
-              <a:buChar char="•"/>
-            </a:pPr>
-            <a:r>
-              <a:rPr lang="en-ZA" sz="1000" dirty="0">
-                <a:solidFill>
-                  <a:schemeClr val="tx1"/>
-                </a:solidFill>
+                <a:latin typeface="Segoe UI" panose="020B0502040204020203" pitchFamily="34" charset="0"/>
+                <a:cs typeface="Segoe UI" panose="020B0502040204020203" pitchFamily="34" charset="0"/>
               </a:rPr>
               <a:t>SPI x 1</a:t>
             </a:r>
@@ -3985,7 +4003,7 @@
         </p:nvSpPr>
         <p:spPr>
           <a:xfrm>
-            <a:off x="5034978" y="4708111"/>
+            <a:off x="5196257" y="4708111"/>
             <a:ext cx="682623" cy="292735"/>
           </a:xfrm>
           <a:prstGeom prst="rect">
@@ -4020,10 +4038,12 @@
           <a:p>
             <a:pPr algn="ctr"/>
             <a:r>
-              <a:rPr lang="en-ZA" sz="1000" dirty="0">
+              <a:rPr lang="en-ZA" sz="800" dirty="0">
                 <a:solidFill>
                   <a:schemeClr val="tx1"/>
                 </a:solidFill>
+                <a:latin typeface="Segoe UI" panose="020B0502040204020203" pitchFamily="34" charset="0"/>
+                <a:cs typeface="Segoe UI" panose="020B0502040204020203" pitchFamily="34" charset="0"/>
               </a:rPr>
               <a:t>Buzzer</a:t>
             </a:r>
@@ -4044,8 +4064,8 @@
         </p:nvSpPr>
         <p:spPr>
           <a:xfrm>
-            <a:off x="3619500" y="4306891"/>
-            <a:ext cx="889000" cy="236534"/>
+            <a:off x="3476303" y="4025384"/>
+            <a:ext cx="1032197" cy="236534"/>
           </a:xfrm>
           <a:prstGeom prst="rect">
             <a:avLst/>
@@ -4079,10 +4099,12 @@
           <a:p>
             <a:pPr algn="ctr"/>
             <a:r>
-              <a:rPr lang="en-ZA" sz="1000" dirty="0">
+              <a:rPr lang="en-ZA" sz="800" dirty="0">
                 <a:solidFill>
                   <a:schemeClr val="tx1"/>
                 </a:solidFill>
+                <a:latin typeface="Segoe UI" panose="020B0502040204020203" pitchFamily="34" charset="0"/>
+                <a:cs typeface="Segoe UI" panose="020B0502040204020203" pitchFamily="34" charset="0"/>
               </a:rPr>
               <a:t>µSD card</a:t>
             </a:r>
@@ -4103,8 +4125,8 @@
         </p:nvSpPr>
         <p:spPr>
           <a:xfrm>
-            <a:off x="3619500" y="3842068"/>
-            <a:ext cx="889000" cy="346393"/>
+            <a:off x="3476303" y="3590152"/>
+            <a:ext cx="1032197" cy="346393"/>
           </a:xfrm>
           <a:prstGeom prst="rect">
             <a:avLst/>
@@ -4138,10 +4160,12 @@
           <a:p>
             <a:pPr algn="ctr"/>
             <a:r>
-              <a:rPr lang="en-ZA" sz="1000" dirty="0">
+              <a:rPr lang="en-ZA" sz="800" b="1" dirty="0">
                 <a:solidFill>
                   <a:schemeClr val="tx1"/>
                 </a:solidFill>
+                <a:latin typeface="Segoe UI" panose="020B0502040204020203" pitchFamily="34" charset="0"/>
+                <a:cs typeface="Segoe UI" panose="020B0502040204020203" pitchFamily="34" charset="0"/>
               </a:rPr>
               <a:t>USB1</a:t>
             </a:r>
@@ -4149,12 +4173,14 @@
           <a:p>
             <a:pPr algn="ctr"/>
             <a:r>
-              <a:rPr lang="en-ZA" sz="1000" dirty="0">
+              <a:rPr lang="en-ZA" sz="800" dirty="0">
                 <a:solidFill>
                   <a:schemeClr val="tx1"/>
                 </a:solidFill>
+                <a:latin typeface="Segoe UI" panose="020B0502040204020203" pitchFamily="34" charset="0"/>
+                <a:cs typeface="Segoe UI" panose="020B0502040204020203" pitchFamily="34" charset="0"/>
               </a:rPr>
-              <a:t>(STM32)</a:t>
+              <a:t>STM32</a:t>
             </a:r>
           </a:p>
         </p:txBody>
@@ -4173,8 +4199,8 @@
         </p:nvSpPr>
         <p:spPr>
           <a:xfrm>
-            <a:off x="3348038" y="3377245"/>
-            <a:ext cx="1160462" cy="346393"/>
+            <a:off x="3476303" y="3154920"/>
+            <a:ext cx="1032196" cy="346393"/>
           </a:xfrm>
           <a:prstGeom prst="rect">
             <a:avLst/>
@@ -4210,10 +4236,12 @@
           <a:p>
             <a:pPr algn="ctr"/>
             <a:r>
-              <a:rPr lang="en-ZA" sz="1000" dirty="0">
+              <a:rPr lang="en-ZA" sz="800" b="1" dirty="0">
                 <a:solidFill>
                   <a:schemeClr val="tx1"/>
                 </a:solidFill>
+                <a:latin typeface="Segoe UI" panose="020B0502040204020203" pitchFamily="34" charset="0"/>
+                <a:cs typeface="Segoe UI" panose="020B0502040204020203" pitchFamily="34" charset="0"/>
               </a:rPr>
               <a:t>USB2</a:t>
             </a:r>
@@ -4221,12 +4249,14 @@
           <a:p>
             <a:pPr algn="ctr"/>
             <a:r>
-              <a:rPr lang="en-ZA" sz="1000" dirty="0">
+              <a:rPr lang="en-ZA" sz="800" dirty="0">
                 <a:solidFill>
                   <a:schemeClr val="tx1"/>
                 </a:solidFill>
+                <a:latin typeface="Segoe UI" panose="020B0502040204020203" pitchFamily="34" charset="0"/>
+                <a:cs typeface="Segoe UI" panose="020B0502040204020203" pitchFamily="34" charset="0"/>
               </a:rPr>
-              <a:t>(USB-Serial Bridge)</a:t>
+              <a:t>USB-Serial Bridge</a:t>
             </a:r>
           </a:p>
         </p:txBody>
@@ -4246,7 +4276,7 @@
         <p:spPr>
           <a:xfrm>
             <a:off x="7106297" y="4705168"/>
-            <a:ext cx="786934" cy="292727"/>
+            <a:ext cx="732778" cy="292727"/>
           </a:xfrm>
           <a:prstGeom prst="rect">
             <a:avLst/>
@@ -4280,26 +4310,32 @@
           <a:p>
             <a:pPr algn="ctr"/>
             <a:r>
-              <a:rPr lang="en-ZA" sz="1000" dirty="0" err="1">
+              <a:rPr lang="en-ZA" sz="800" dirty="0" err="1">
                 <a:solidFill>
                   <a:schemeClr val="tx1"/>
                 </a:solidFill>
+                <a:latin typeface="Segoe UI" panose="020B0502040204020203" pitchFamily="34" charset="0"/>
+                <a:cs typeface="Segoe UI" panose="020B0502040204020203" pitchFamily="34" charset="0"/>
               </a:rPr>
               <a:t>Seeed</a:t>
             </a:r>
-            <a:endParaRPr lang="en-ZA" sz="1000" dirty="0">
+            <a:endParaRPr lang="en-ZA" sz="800" dirty="0">
               <a:solidFill>
                 <a:schemeClr val="tx1"/>
               </a:solidFill>
+              <a:latin typeface="Segoe UI" panose="020B0502040204020203" pitchFamily="34" charset="0"/>
+              <a:cs typeface="Segoe UI" panose="020B0502040204020203" pitchFamily="34" charset="0"/>
             </a:endParaRPr>
           </a:p>
           <a:p>
             <a:pPr algn="ctr"/>
             <a:r>
-              <a:rPr lang="en-ZA" sz="1000" dirty="0">
+              <a:rPr lang="en-ZA" sz="800" b="1" dirty="0">
                 <a:solidFill>
                   <a:schemeClr val="tx1"/>
                 </a:solidFill>
+                <a:latin typeface="Segoe UI" panose="020B0502040204020203" pitchFamily="34" charset="0"/>
+                <a:cs typeface="Segoe UI" panose="020B0502040204020203" pitchFamily="34" charset="0"/>
               </a:rPr>
               <a:t>GROVE I2C</a:t>
             </a:r>
@@ -4320,8 +4356,8 @@
         </p:nvSpPr>
         <p:spPr>
           <a:xfrm>
-            <a:off x="5889624" y="4707554"/>
-            <a:ext cx="1042861" cy="292728"/>
+            <a:off x="6053138" y="4707554"/>
+            <a:ext cx="879347" cy="292728"/>
           </a:xfrm>
           <a:prstGeom prst="rect">
             <a:avLst/>
@@ -4355,42 +4391,52 @@
           <a:p>
             <a:pPr algn="ctr"/>
             <a:r>
-              <a:rPr lang="en-ZA" sz="1000" dirty="0" err="1">
+              <a:rPr lang="en-ZA" sz="800" dirty="0" err="1">
                 <a:solidFill>
                   <a:schemeClr val="tx1"/>
                 </a:solidFill>
+                <a:latin typeface="Segoe UI" panose="020B0502040204020203" pitchFamily="34" charset="0"/>
+                <a:cs typeface="Segoe UI" panose="020B0502040204020203" pitchFamily="34" charset="0"/>
               </a:rPr>
               <a:t>Sparkfun</a:t>
             </a:r>
             <a:r>
-              <a:rPr lang="en-ZA" sz="1000" dirty="0">
+              <a:rPr lang="en-ZA" sz="800" dirty="0">
                 <a:solidFill>
                   <a:schemeClr val="tx1"/>
                 </a:solidFill>
+                <a:latin typeface="Segoe UI" panose="020B0502040204020203" pitchFamily="34" charset="0"/>
+                <a:cs typeface="Segoe UI" panose="020B0502040204020203" pitchFamily="34" charset="0"/>
               </a:rPr>
               <a:t> </a:t>
             </a:r>
             <a:r>
-              <a:rPr lang="en-ZA" sz="1000" dirty="0" err="1">
+              <a:rPr lang="en-ZA" sz="800" b="1" dirty="0" err="1">
                 <a:solidFill>
                   <a:schemeClr val="tx1"/>
                 </a:solidFill>
+                <a:latin typeface="Segoe UI" panose="020B0502040204020203" pitchFamily="34" charset="0"/>
+                <a:cs typeface="Segoe UI" panose="020B0502040204020203" pitchFamily="34" charset="0"/>
               </a:rPr>
               <a:t>Qwiic</a:t>
             </a:r>
-            <a:endParaRPr lang="en-ZA" sz="1000" dirty="0">
+            <a:endParaRPr lang="en-ZA" sz="800" b="1" dirty="0">
               <a:solidFill>
                 <a:schemeClr val="tx1"/>
               </a:solidFill>
+              <a:latin typeface="Segoe UI" panose="020B0502040204020203" pitchFamily="34" charset="0"/>
+              <a:cs typeface="Segoe UI" panose="020B0502040204020203" pitchFamily="34" charset="0"/>
             </a:endParaRPr>
           </a:p>
           <a:p>
             <a:pPr algn="ctr"/>
             <a:r>
-              <a:rPr lang="en-ZA" sz="1000" dirty="0">
+              <a:rPr lang="en-ZA" sz="800" b="1" dirty="0">
                 <a:solidFill>
                   <a:schemeClr val="tx1"/>
                 </a:solidFill>
+                <a:latin typeface="Segoe UI" panose="020B0502040204020203" pitchFamily="34" charset="0"/>
+                <a:cs typeface="Segoe UI" panose="020B0502040204020203" pitchFamily="34" charset="0"/>
               </a:rPr>
               <a:t>STEMMA QT</a:t>
             </a:r>
@@ -4411,8 +4457,8 @@
         </p:nvSpPr>
         <p:spPr>
           <a:xfrm>
-            <a:off x="3348037" y="1764956"/>
-            <a:ext cx="1160783" cy="399630"/>
+            <a:off x="3476625" y="1863738"/>
+            <a:ext cx="1032195" cy="300848"/>
           </a:xfrm>
           <a:prstGeom prst="rect">
             <a:avLst/>
@@ -4446,10 +4492,12 @@
           <a:p>
             <a:pPr algn="ctr"/>
             <a:r>
-              <a:rPr lang="en-ZA" sz="1000" dirty="0">
+              <a:rPr lang="en-ZA" sz="800" dirty="0">
                 <a:solidFill>
                   <a:schemeClr val="tx1"/>
                 </a:solidFill>
+                <a:latin typeface="Segoe UI" panose="020B0502040204020203" pitchFamily="34" charset="0"/>
+                <a:cs typeface="Segoe UI" panose="020B0502040204020203" pitchFamily="34" charset="0"/>
               </a:rPr>
               <a:t>+3V3 step-down DC-DC Regulator</a:t>
             </a:r>
@@ -4517,9 +4565,9 @@
           <p:nvPr/>
         </p:nvCxnSpPr>
         <p:spPr>
-          <a:xfrm flipV="1">
-            <a:off x="4508500" y="3429000"/>
-            <a:ext cx="142240" cy="121442"/>
+          <a:xfrm>
+            <a:off x="4508499" y="3328117"/>
+            <a:ext cx="142241" cy="100883"/>
           </a:xfrm>
           <a:prstGeom prst="straightConnector1">
             <a:avLst/>
@@ -4557,13 +4605,14 @@
           </p:cNvPr>
           <p:cNvCxnSpPr>
             <a:cxnSpLocks/>
+            <a:stCxn id="18" idx="3"/>
           </p:cNvCxnSpPr>
           <p:nvPr/>
         </p:nvCxnSpPr>
         <p:spPr>
           <a:xfrm flipV="1">
-            <a:off x="4508500" y="3720626"/>
-            <a:ext cx="142240" cy="121443"/>
+            <a:off x="4508500" y="3682387"/>
+            <a:ext cx="142240" cy="80962"/>
           </a:xfrm>
           <a:prstGeom prst="straightConnector1">
             <a:avLst/>
@@ -4601,13 +4650,14 @@
           </p:cNvPr>
           <p:cNvCxnSpPr>
             <a:cxnSpLocks/>
+            <a:stCxn id="17" idx="3"/>
           </p:cNvCxnSpPr>
           <p:nvPr/>
         </p:nvCxnSpPr>
         <p:spPr>
-          <a:xfrm flipV="1">
-            <a:off x="4508500" y="4133695"/>
-            <a:ext cx="173038" cy="170021"/>
+          <a:xfrm>
+            <a:off x="4508500" y="4143651"/>
+            <a:ext cx="220663" cy="0"/>
           </a:xfrm>
           <a:prstGeom prst="straightConnector1">
             <a:avLst/>
@@ -4650,8 +4700,8 @@
         </p:nvCxnSpPr>
         <p:spPr>
           <a:xfrm flipV="1">
-            <a:off x="5715812" y="4562435"/>
-            <a:ext cx="231759" cy="145676"/>
+            <a:off x="5878880" y="4550380"/>
+            <a:ext cx="93481" cy="157731"/>
           </a:xfrm>
           <a:prstGeom prst="straightConnector1">
             <a:avLst/>
@@ -4695,8 +4745,8 @@
         </p:nvCxnSpPr>
         <p:spPr>
           <a:xfrm flipV="1">
-            <a:off x="6411055" y="4550380"/>
-            <a:ext cx="95440" cy="157174"/>
+            <a:off x="6492812" y="4550380"/>
+            <a:ext cx="13683" cy="157174"/>
           </a:xfrm>
           <a:prstGeom prst="straightConnector1">
             <a:avLst/>
@@ -4784,8 +4834,8 @@
         </p:nvCxnSpPr>
         <p:spPr>
           <a:xfrm flipH="1">
-            <a:off x="6900864" y="2518813"/>
-            <a:ext cx="738514" cy="175590"/>
+            <a:off x="6925217" y="2562241"/>
+            <a:ext cx="714161" cy="129531"/>
           </a:xfrm>
           <a:prstGeom prst="straightConnector1">
             <a:avLst/>
@@ -4917,8 +4967,8 @@
         </p:nvCxnSpPr>
         <p:spPr>
           <a:xfrm>
-            <a:off x="6741977" y="2164584"/>
-            <a:ext cx="4898" cy="130982"/>
+            <a:off x="6741977" y="2164583"/>
+            <a:ext cx="4898" cy="130983"/>
           </a:xfrm>
           <a:prstGeom prst="straightConnector1">
             <a:avLst/>
@@ -5003,8 +5053,8 @@
         </p:nvSpPr>
         <p:spPr>
           <a:xfrm>
-            <a:off x="7639378" y="2218925"/>
-            <a:ext cx="947410" cy="599776"/>
+            <a:off x="7639378" y="2349585"/>
+            <a:ext cx="1266497" cy="425312"/>
           </a:xfrm>
           <a:prstGeom prst="rect">
             <a:avLst/>
@@ -5038,10 +5088,12 @@
           <a:p>
             <a:pPr algn="ctr"/>
             <a:r>
-              <a:rPr lang="en-ZA" sz="1000" dirty="0">
+              <a:rPr lang="en-ZA" sz="800" dirty="0">
                 <a:solidFill>
                   <a:schemeClr val="tx1"/>
                 </a:solidFill>
+                <a:latin typeface="Segoe UI" panose="020B0502040204020203" pitchFamily="34" charset="0"/>
+                <a:cs typeface="Segoe UI" panose="020B0502040204020203" pitchFamily="34" charset="0"/>
               </a:rPr>
               <a:t>Standard ARM Cortex debug</a:t>
             </a:r>
@@ -5049,10 +5101,12 @@
           <a:p>
             <a:pPr algn="ctr"/>
             <a:r>
-              <a:rPr lang="en-ZA" sz="1000" dirty="0">
+              <a:rPr lang="en-ZA" sz="800" dirty="0">
                 <a:solidFill>
                   <a:schemeClr val="tx1"/>
                 </a:solidFill>
+                <a:latin typeface="Segoe UI" panose="020B0502040204020203" pitchFamily="34" charset="0"/>
+                <a:cs typeface="Segoe UI" panose="020B0502040204020203" pitchFamily="34" charset="0"/>
               </a:rPr>
               <a:t>connector footprint</a:t>
             </a:r>

</xml_diff>

<commit_message>
Updated PX-HER0 board top and bottom annotated pictures
</commit_message>
<xml_diff>
--- a/doc/images/hero_board/hero_board_bot_annotated.pptx
+++ b/doc/images/hero_board/hero_board_bot_annotated.pptx
@@ -261,7 +261,7 @@
           <a:p>
             <a:fld id="{A4A54569-7902-4945-B214-29C88B7567F2}" type="datetimeFigureOut">
               <a:rPr lang="en-ZA" smtClean="0"/>
-              <a:t>2019-11-28</a:t>
+              <a:t>2019-11-29</a:t>
             </a:fld>
             <a:endParaRPr lang="en-ZA"/>
           </a:p>
@@ -461,7 +461,7 @@
           <a:p>
             <a:fld id="{A4A54569-7902-4945-B214-29C88B7567F2}" type="datetimeFigureOut">
               <a:rPr lang="en-ZA" smtClean="0"/>
-              <a:t>2019-11-28</a:t>
+              <a:t>2019-11-29</a:t>
             </a:fld>
             <a:endParaRPr lang="en-ZA"/>
           </a:p>
@@ -671,7 +671,7 @@
           <a:p>
             <a:fld id="{A4A54569-7902-4945-B214-29C88B7567F2}" type="datetimeFigureOut">
               <a:rPr lang="en-ZA" smtClean="0"/>
-              <a:t>2019-11-28</a:t>
+              <a:t>2019-11-29</a:t>
             </a:fld>
             <a:endParaRPr lang="en-ZA"/>
           </a:p>
@@ -871,7 +871,7 @@
           <a:p>
             <a:fld id="{A4A54569-7902-4945-B214-29C88B7567F2}" type="datetimeFigureOut">
               <a:rPr lang="en-ZA" smtClean="0"/>
-              <a:t>2019-11-28</a:t>
+              <a:t>2019-11-29</a:t>
             </a:fld>
             <a:endParaRPr lang="en-ZA"/>
           </a:p>
@@ -1147,7 +1147,7 @@
           <a:p>
             <a:fld id="{A4A54569-7902-4945-B214-29C88B7567F2}" type="datetimeFigureOut">
               <a:rPr lang="en-ZA" smtClean="0"/>
-              <a:t>2019-11-28</a:t>
+              <a:t>2019-11-29</a:t>
             </a:fld>
             <a:endParaRPr lang="en-ZA"/>
           </a:p>
@@ -1415,7 +1415,7 @@
           <a:p>
             <a:fld id="{A4A54569-7902-4945-B214-29C88B7567F2}" type="datetimeFigureOut">
               <a:rPr lang="en-ZA" smtClean="0"/>
-              <a:t>2019-11-28</a:t>
+              <a:t>2019-11-29</a:t>
             </a:fld>
             <a:endParaRPr lang="en-ZA"/>
           </a:p>
@@ -1830,7 +1830,7 @@
           <a:p>
             <a:fld id="{A4A54569-7902-4945-B214-29C88B7567F2}" type="datetimeFigureOut">
               <a:rPr lang="en-ZA" smtClean="0"/>
-              <a:t>2019-11-28</a:t>
+              <a:t>2019-11-29</a:t>
             </a:fld>
             <a:endParaRPr lang="en-ZA"/>
           </a:p>
@@ -1972,7 +1972,7 @@
           <a:p>
             <a:fld id="{A4A54569-7902-4945-B214-29C88B7567F2}" type="datetimeFigureOut">
               <a:rPr lang="en-ZA" smtClean="0"/>
-              <a:t>2019-11-28</a:t>
+              <a:t>2019-11-29</a:t>
             </a:fld>
             <a:endParaRPr lang="en-ZA"/>
           </a:p>
@@ -2085,7 +2085,7 @@
           <a:p>
             <a:fld id="{A4A54569-7902-4945-B214-29C88B7567F2}" type="datetimeFigureOut">
               <a:rPr lang="en-ZA" smtClean="0"/>
-              <a:t>2019-11-28</a:t>
+              <a:t>2019-11-29</a:t>
             </a:fld>
             <a:endParaRPr lang="en-ZA"/>
           </a:p>
@@ -2398,7 +2398,7 @@
           <a:p>
             <a:fld id="{A4A54569-7902-4945-B214-29C88B7567F2}" type="datetimeFigureOut">
               <a:rPr lang="en-ZA" smtClean="0"/>
-              <a:t>2019-11-28</a:t>
+              <a:t>2019-11-29</a:t>
             </a:fld>
             <a:endParaRPr lang="en-ZA"/>
           </a:p>
@@ -2687,7 +2687,7 @@
           <a:p>
             <a:fld id="{A4A54569-7902-4945-B214-29C88B7567F2}" type="datetimeFigureOut">
               <a:rPr lang="en-ZA" smtClean="0"/>
-              <a:t>2019-11-28</a:t>
+              <a:t>2019-11-29</a:t>
             </a:fld>
             <a:endParaRPr lang="en-ZA"/>
           </a:p>
@@ -2930,7 +2930,7 @@
           <a:p>
             <a:fld id="{A4A54569-7902-4945-B214-29C88B7567F2}" type="datetimeFigureOut">
               <a:rPr lang="en-ZA" smtClean="0"/>
-              <a:t>2019-11-28</a:t>
+              <a:t>2019-11-29</a:t>
             </a:fld>
             <a:endParaRPr lang="en-ZA"/>
           </a:p>
@@ -3374,8 +3374,8 @@
         </p:blipFill>
         <p:spPr>
           <a:xfrm>
-            <a:off x="4650740" y="2295566"/>
-            <a:ext cx="2890520" cy="2266868"/>
+            <a:off x="4650740" y="2295931"/>
+            <a:ext cx="2890520" cy="2266138"/>
           </a:xfrm>
           <a:prstGeom prst="rect">
             <a:avLst/>

</xml_diff>

<commit_message>
Updated pictures of PX-HER0 board
</commit_message>
<xml_diff>
--- a/doc/images/hero_board/hero_board_bot_annotated.pptx
+++ b/doc/images/hero_board/hero_board_bot_annotated.pptx
@@ -261,7 +261,7 @@
           <a:p>
             <a:fld id="{A4A54569-7902-4945-B214-29C88B7567F2}" type="datetimeFigureOut">
               <a:rPr lang="en-ZA" smtClean="0"/>
-              <a:t>2019-11-29</a:t>
+              <a:t>2019/12/15</a:t>
             </a:fld>
             <a:endParaRPr lang="en-ZA"/>
           </a:p>
@@ -461,7 +461,7 @@
           <a:p>
             <a:fld id="{A4A54569-7902-4945-B214-29C88B7567F2}" type="datetimeFigureOut">
               <a:rPr lang="en-ZA" smtClean="0"/>
-              <a:t>2019-11-29</a:t>
+              <a:t>2019/12/15</a:t>
             </a:fld>
             <a:endParaRPr lang="en-ZA"/>
           </a:p>
@@ -671,7 +671,7 @@
           <a:p>
             <a:fld id="{A4A54569-7902-4945-B214-29C88B7567F2}" type="datetimeFigureOut">
               <a:rPr lang="en-ZA" smtClean="0"/>
-              <a:t>2019-11-29</a:t>
+              <a:t>2019/12/15</a:t>
             </a:fld>
             <a:endParaRPr lang="en-ZA"/>
           </a:p>
@@ -871,7 +871,7 @@
           <a:p>
             <a:fld id="{A4A54569-7902-4945-B214-29C88B7567F2}" type="datetimeFigureOut">
               <a:rPr lang="en-ZA" smtClean="0"/>
-              <a:t>2019-11-29</a:t>
+              <a:t>2019/12/15</a:t>
             </a:fld>
             <a:endParaRPr lang="en-ZA"/>
           </a:p>
@@ -1147,7 +1147,7 @@
           <a:p>
             <a:fld id="{A4A54569-7902-4945-B214-29C88B7567F2}" type="datetimeFigureOut">
               <a:rPr lang="en-ZA" smtClean="0"/>
-              <a:t>2019-11-29</a:t>
+              <a:t>2019/12/15</a:t>
             </a:fld>
             <a:endParaRPr lang="en-ZA"/>
           </a:p>
@@ -1415,7 +1415,7 @@
           <a:p>
             <a:fld id="{A4A54569-7902-4945-B214-29C88B7567F2}" type="datetimeFigureOut">
               <a:rPr lang="en-ZA" smtClean="0"/>
-              <a:t>2019-11-29</a:t>
+              <a:t>2019/12/15</a:t>
             </a:fld>
             <a:endParaRPr lang="en-ZA"/>
           </a:p>
@@ -1830,7 +1830,7 @@
           <a:p>
             <a:fld id="{A4A54569-7902-4945-B214-29C88B7567F2}" type="datetimeFigureOut">
               <a:rPr lang="en-ZA" smtClean="0"/>
-              <a:t>2019-11-29</a:t>
+              <a:t>2019/12/15</a:t>
             </a:fld>
             <a:endParaRPr lang="en-ZA"/>
           </a:p>
@@ -1972,7 +1972,7 @@
           <a:p>
             <a:fld id="{A4A54569-7902-4945-B214-29C88B7567F2}" type="datetimeFigureOut">
               <a:rPr lang="en-ZA" smtClean="0"/>
-              <a:t>2019-11-29</a:t>
+              <a:t>2019/12/15</a:t>
             </a:fld>
             <a:endParaRPr lang="en-ZA"/>
           </a:p>
@@ -2085,7 +2085,7 @@
           <a:p>
             <a:fld id="{A4A54569-7902-4945-B214-29C88B7567F2}" type="datetimeFigureOut">
               <a:rPr lang="en-ZA" smtClean="0"/>
-              <a:t>2019-11-29</a:t>
+              <a:t>2019/12/15</a:t>
             </a:fld>
             <a:endParaRPr lang="en-ZA"/>
           </a:p>
@@ -2398,7 +2398,7 @@
           <a:p>
             <a:fld id="{A4A54569-7902-4945-B214-29C88B7567F2}" type="datetimeFigureOut">
               <a:rPr lang="en-ZA" smtClean="0"/>
-              <a:t>2019-11-29</a:t>
+              <a:t>2019/12/15</a:t>
             </a:fld>
             <a:endParaRPr lang="en-ZA"/>
           </a:p>
@@ -2687,7 +2687,7 @@
           <a:p>
             <a:fld id="{A4A54569-7902-4945-B214-29C88B7567F2}" type="datetimeFigureOut">
               <a:rPr lang="en-ZA" smtClean="0"/>
-              <a:t>2019-11-29</a:t>
+              <a:t>2019/12/15</a:t>
             </a:fld>
             <a:endParaRPr lang="en-ZA"/>
           </a:p>
@@ -2930,7 +2930,7 @@
           <a:p>
             <a:fld id="{A4A54569-7902-4945-B214-29C88B7567F2}" type="datetimeFigureOut">
               <a:rPr lang="en-ZA" smtClean="0"/>
-              <a:t>2019-11-29</a:t>
+              <a:t>2019/12/15</a:t>
             </a:fld>
             <a:endParaRPr lang="en-ZA"/>
           </a:p>
@@ -3374,8 +3374,8 @@
         </p:blipFill>
         <p:spPr>
           <a:xfrm>
-            <a:off x="4650740" y="2295931"/>
-            <a:ext cx="2890520" cy="2266138"/>
+            <a:off x="4650740" y="2298836"/>
+            <a:ext cx="2890520" cy="2260328"/>
           </a:xfrm>
           <a:prstGeom prst="rect">
             <a:avLst/>
@@ -4275,7 +4275,7 @@
         </p:nvSpPr>
         <p:spPr>
           <a:xfrm>
-            <a:off x="7106297" y="4705168"/>
+            <a:off x="7106297" y="4708111"/>
             <a:ext cx="732778" cy="292727"/>
           </a:xfrm>
           <a:prstGeom prst="rect">
@@ -4457,7 +4457,7 @@
         </p:nvSpPr>
         <p:spPr>
           <a:xfrm>
-            <a:off x="3476625" y="1863738"/>
+            <a:off x="3476304" y="1863738"/>
             <a:ext cx="1032195" cy="300848"/>
           </a:xfrm>
           <a:prstGeom prst="rect">
@@ -4499,7 +4499,7 @@
                 <a:latin typeface="Segoe UI" panose="020B0502040204020203" pitchFamily="34" charset="0"/>
                 <a:cs typeface="Segoe UI" panose="020B0502040204020203" pitchFamily="34" charset="0"/>
               </a:rPr>
-              <a:t>+3V3 step-down DC-DC Regulator</a:t>
+              <a:t>+3V3 step-down DC-DC regulator</a:t>
             </a:r>
           </a:p>
         </p:txBody>
@@ -4560,14 +4560,13 @@
           <p:cNvCxnSpPr>
             <a:cxnSpLocks/>
             <a:stCxn id="19" idx="3"/>
-            <a:endCxn id="5" idx="1"/>
           </p:cNvCxnSpPr>
           <p:nvPr/>
         </p:nvCxnSpPr>
         <p:spPr>
           <a:xfrm>
             <a:off x="4508499" y="3328117"/>
-            <a:ext cx="142241" cy="100883"/>
+            <a:ext cx="142241" cy="0"/>
           </a:xfrm>
           <a:prstGeom prst="straightConnector1">
             <a:avLst/>
@@ -4834,8 +4833,8 @@
         </p:nvCxnSpPr>
         <p:spPr>
           <a:xfrm flipH="1">
-            <a:off x="6925217" y="2562241"/>
-            <a:ext cx="714161" cy="129531"/>
+            <a:off x="6889750" y="2562241"/>
+            <a:ext cx="749628" cy="111109"/>
           </a:xfrm>
           <a:prstGeom prst="straightConnector1">
             <a:avLst/>
@@ -5095,20 +5094,7 @@
                 <a:latin typeface="Segoe UI" panose="020B0502040204020203" pitchFamily="34" charset="0"/>
                 <a:cs typeface="Segoe UI" panose="020B0502040204020203" pitchFamily="34" charset="0"/>
               </a:rPr>
-              <a:t>Standard ARM Cortex debug</a:t>
-            </a:r>
-          </a:p>
-          <a:p>
-            <a:pPr algn="ctr"/>
-            <a:r>
-              <a:rPr lang="en-ZA" sz="800" dirty="0">
-                <a:solidFill>
-                  <a:schemeClr val="tx1"/>
-                </a:solidFill>
-                <a:latin typeface="Segoe UI" panose="020B0502040204020203" pitchFamily="34" charset="0"/>
-                <a:cs typeface="Segoe UI" panose="020B0502040204020203" pitchFamily="34" charset="0"/>
-              </a:rPr>
-              <a:t>connector footprint</a:t>
+              <a:t>Standard ARM Cortex debug connector footprint</a:t>
             </a:r>
           </a:p>
         </p:txBody>

</xml_diff>

<commit_message>
Changed text from "uSD" to "MicroSD"
</commit_message>
<xml_diff>
--- a/doc/images/hero_board/hero_board_bot_annotated.pptx
+++ b/doc/images/hero_board/hero_board_bot_annotated.pptx
@@ -261,7 +261,7 @@
           <a:p>
             <a:fld id="{A4A54569-7902-4945-B214-29C88B7567F2}" type="datetimeFigureOut">
               <a:rPr lang="en-ZA" smtClean="0"/>
-              <a:t>2019/12/15</a:t>
+              <a:t>2020/01/08</a:t>
             </a:fld>
             <a:endParaRPr lang="en-ZA"/>
           </a:p>
@@ -461,7 +461,7 @@
           <a:p>
             <a:fld id="{A4A54569-7902-4945-B214-29C88B7567F2}" type="datetimeFigureOut">
               <a:rPr lang="en-ZA" smtClean="0"/>
-              <a:t>2019/12/15</a:t>
+              <a:t>2020/01/08</a:t>
             </a:fld>
             <a:endParaRPr lang="en-ZA"/>
           </a:p>
@@ -671,7 +671,7 @@
           <a:p>
             <a:fld id="{A4A54569-7902-4945-B214-29C88B7567F2}" type="datetimeFigureOut">
               <a:rPr lang="en-ZA" smtClean="0"/>
-              <a:t>2019/12/15</a:t>
+              <a:t>2020/01/08</a:t>
             </a:fld>
             <a:endParaRPr lang="en-ZA"/>
           </a:p>
@@ -871,7 +871,7 @@
           <a:p>
             <a:fld id="{A4A54569-7902-4945-B214-29C88B7567F2}" type="datetimeFigureOut">
               <a:rPr lang="en-ZA" smtClean="0"/>
-              <a:t>2019/12/15</a:t>
+              <a:t>2020/01/08</a:t>
             </a:fld>
             <a:endParaRPr lang="en-ZA"/>
           </a:p>
@@ -1147,7 +1147,7 @@
           <a:p>
             <a:fld id="{A4A54569-7902-4945-B214-29C88B7567F2}" type="datetimeFigureOut">
               <a:rPr lang="en-ZA" smtClean="0"/>
-              <a:t>2019/12/15</a:t>
+              <a:t>2020/01/08</a:t>
             </a:fld>
             <a:endParaRPr lang="en-ZA"/>
           </a:p>
@@ -1415,7 +1415,7 @@
           <a:p>
             <a:fld id="{A4A54569-7902-4945-B214-29C88B7567F2}" type="datetimeFigureOut">
               <a:rPr lang="en-ZA" smtClean="0"/>
-              <a:t>2019/12/15</a:t>
+              <a:t>2020/01/08</a:t>
             </a:fld>
             <a:endParaRPr lang="en-ZA"/>
           </a:p>
@@ -1830,7 +1830,7 @@
           <a:p>
             <a:fld id="{A4A54569-7902-4945-B214-29C88B7567F2}" type="datetimeFigureOut">
               <a:rPr lang="en-ZA" smtClean="0"/>
-              <a:t>2019/12/15</a:t>
+              <a:t>2020/01/08</a:t>
             </a:fld>
             <a:endParaRPr lang="en-ZA"/>
           </a:p>
@@ -1972,7 +1972,7 @@
           <a:p>
             <a:fld id="{A4A54569-7902-4945-B214-29C88B7567F2}" type="datetimeFigureOut">
               <a:rPr lang="en-ZA" smtClean="0"/>
-              <a:t>2019/12/15</a:t>
+              <a:t>2020/01/08</a:t>
             </a:fld>
             <a:endParaRPr lang="en-ZA"/>
           </a:p>
@@ -2085,7 +2085,7 @@
           <a:p>
             <a:fld id="{A4A54569-7902-4945-B214-29C88B7567F2}" type="datetimeFigureOut">
               <a:rPr lang="en-ZA" smtClean="0"/>
-              <a:t>2019/12/15</a:t>
+              <a:t>2020/01/08</a:t>
             </a:fld>
             <a:endParaRPr lang="en-ZA"/>
           </a:p>
@@ -2398,7 +2398,7 @@
           <a:p>
             <a:fld id="{A4A54569-7902-4945-B214-29C88B7567F2}" type="datetimeFigureOut">
               <a:rPr lang="en-ZA" smtClean="0"/>
-              <a:t>2019/12/15</a:t>
+              <a:t>2020/01/08</a:t>
             </a:fld>
             <a:endParaRPr lang="en-ZA"/>
           </a:p>
@@ -2687,7 +2687,7 @@
           <a:p>
             <a:fld id="{A4A54569-7902-4945-B214-29C88B7567F2}" type="datetimeFigureOut">
               <a:rPr lang="en-ZA" smtClean="0"/>
-              <a:t>2019/12/15</a:t>
+              <a:t>2020/01/08</a:t>
             </a:fld>
             <a:endParaRPr lang="en-ZA"/>
           </a:p>
@@ -2930,7 +2930,7 @@
           <a:p>
             <a:fld id="{A4A54569-7902-4945-B214-29C88B7567F2}" type="datetimeFigureOut">
               <a:rPr lang="en-ZA" smtClean="0"/>
-              <a:t>2019/12/15</a:t>
+              <a:t>2020/01/08</a:t>
             </a:fld>
             <a:endParaRPr lang="en-ZA"/>
           </a:p>
@@ -4106,7 +4106,7 @@
                 <a:latin typeface="Segoe UI" panose="020B0502040204020203" pitchFamily="34" charset="0"/>
                 <a:cs typeface="Segoe UI" panose="020B0502040204020203" pitchFamily="34" charset="0"/>
               </a:rPr>
-              <a:t>µSD card</a:t>
+              <a:t>MicroSD card</a:t>
             </a:r>
           </a:p>
         </p:txBody>
@@ -4356,8 +4356,8 @@
         </p:nvSpPr>
         <p:spPr>
           <a:xfrm>
-            <a:off x="6053138" y="4707554"/>
-            <a:ext cx="879347" cy="292728"/>
+            <a:off x="6053138" y="4701527"/>
+            <a:ext cx="879347" cy="299311"/>
           </a:xfrm>
           <a:prstGeom prst="rect">
             <a:avLst/>
@@ -4744,8 +4744,8 @@
         </p:nvCxnSpPr>
         <p:spPr>
           <a:xfrm flipV="1">
-            <a:off x="6492812" y="4550380"/>
-            <a:ext cx="13683" cy="157174"/>
+            <a:off x="6492812" y="4550381"/>
+            <a:ext cx="13683" cy="151146"/>
           </a:xfrm>
           <a:prstGeom prst="straightConnector1">
             <a:avLst/>

</xml_diff>

<commit_message>
Updated PX-HER0 board pictures with right connectors
</commit_message>
<xml_diff>
--- a/doc/images/hero_board/hero_board_bot_annotated.pptx
+++ b/doc/images/hero_board/hero_board_bot_annotated.pptx
@@ -261,7 +261,7 @@
           <a:p>
             <a:fld id="{A4A54569-7902-4945-B214-29C88B7567F2}" type="datetimeFigureOut">
               <a:rPr lang="en-ZA" smtClean="0"/>
-              <a:t>2020/01/18</a:t>
+              <a:t>2020/01/26</a:t>
             </a:fld>
             <a:endParaRPr lang="en-ZA"/>
           </a:p>
@@ -461,7 +461,7 @@
           <a:p>
             <a:fld id="{A4A54569-7902-4945-B214-29C88B7567F2}" type="datetimeFigureOut">
               <a:rPr lang="en-ZA" smtClean="0"/>
-              <a:t>2020/01/18</a:t>
+              <a:t>2020/01/26</a:t>
             </a:fld>
             <a:endParaRPr lang="en-ZA"/>
           </a:p>
@@ -671,7 +671,7 @@
           <a:p>
             <a:fld id="{A4A54569-7902-4945-B214-29C88B7567F2}" type="datetimeFigureOut">
               <a:rPr lang="en-ZA" smtClean="0"/>
-              <a:t>2020/01/18</a:t>
+              <a:t>2020/01/26</a:t>
             </a:fld>
             <a:endParaRPr lang="en-ZA"/>
           </a:p>
@@ -871,7 +871,7 @@
           <a:p>
             <a:fld id="{A4A54569-7902-4945-B214-29C88B7567F2}" type="datetimeFigureOut">
               <a:rPr lang="en-ZA" smtClean="0"/>
-              <a:t>2020/01/18</a:t>
+              <a:t>2020/01/26</a:t>
             </a:fld>
             <a:endParaRPr lang="en-ZA"/>
           </a:p>
@@ -1147,7 +1147,7 @@
           <a:p>
             <a:fld id="{A4A54569-7902-4945-B214-29C88B7567F2}" type="datetimeFigureOut">
               <a:rPr lang="en-ZA" smtClean="0"/>
-              <a:t>2020/01/18</a:t>
+              <a:t>2020/01/26</a:t>
             </a:fld>
             <a:endParaRPr lang="en-ZA"/>
           </a:p>
@@ -1415,7 +1415,7 @@
           <a:p>
             <a:fld id="{A4A54569-7902-4945-B214-29C88B7567F2}" type="datetimeFigureOut">
               <a:rPr lang="en-ZA" smtClean="0"/>
-              <a:t>2020/01/18</a:t>
+              <a:t>2020/01/26</a:t>
             </a:fld>
             <a:endParaRPr lang="en-ZA"/>
           </a:p>
@@ -1830,7 +1830,7 @@
           <a:p>
             <a:fld id="{A4A54569-7902-4945-B214-29C88B7567F2}" type="datetimeFigureOut">
               <a:rPr lang="en-ZA" smtClean="0"/>
-              <a:t>2020/01/18</a:t>
+              <a:t>2020/01/26</a:t>
             </a:fld>
             <a:endParaRPr lang="en-ZA"/>
           </a:p>
@@ -1972,7 +1972,7 @@
           <a:p>
             <a:fld id="{A4A54569-7902-4945-B214-29C88B7567F2}" type="datetimeFigureOut">
               <a:rPr lang="en-ZA" smtClean="0"/>
-              <a:t>2020/01/18</a:t>
+              <a:t>2020/01/26</a:t>
             </a:fld>
             <a:endParaRPr lang="en-ZA"/>
           </a:p>
@@ -2085,7 +2085,7 @@
           <a:p>
             <a:fld id="{A4A54569-7902-4945-B214-29C88B7567F2}" type="datetimeFigureOut">
               <a:rPr lang="en-ZA" smtClean="0"/>
-              <a:t>2020/01/18</a:t>
+              <a:t>2020/01/26</a:t>
             </a:fld>
             <a:endParaRPr lang="en-ZA"/>
           </a:p>
@@ -2398,7 +2398,7 @@
           <a:p>
             <a:fld id="{A4A54569-7902-4945-B214-29C88B7567F2}" type="datetimeFigureOut">
               <a:rPr lang="en-ZA" smtClean="0"/>
-              <a:t>2020/01/18</a:t>
+              <a:t>2020/01/26</a:t>
             </a:fld>
             <a:endParaRPr lang="en-ZA"/>
           </a:p>
@@ -2687,7 +2687,7 @@
           <a:p>
             <a:fld id="{A4A54569-7902-4945-B214-29C88B7567F2}" type="datetimeFigureOut">
               <a:rPr lang="en-ZA" smtClean="0"/>
-              <a:t>2020/01/18</a:t>
+              <a:t>2020/01/26</a:t>
             </a:fld>
             <a:endParaRPr lang="en-ZA"/>
           </a:p>
@@ -2930,7 +2930,7 @@
           <a:p>
             <a:fld id="{A4A54569-7902-4945-B214-29C88B7567F2}" type="datetimeFigureOut">
               <a:rPr lang="en-ZA" smtClean="0"/>
-              <a:t>2020/01/18</a:t>
+              <a:t>2020/01/26</a:t>
             </a:fld>
             <a:endParaRPr lang="en-ZA"/>
           </a:p>
@@ -3374,8 +3374,8 @@
         </p:blipFill>
         <p:spPr>
           <a:xfrm>
-            <a:off x="4651573" y="2298836"/>
-            <a:ext cx="2888854" cy="2260328"/>
+            <a:off x="4664022" y="2298836"/>
+            <a:ext cx="2863956" cy="2260328"/>
           </a:xfrm>
           <a:prstGeom prst="rect">
             <a:avLst/>
@@ -3475,8 +3475,8 @@
         </p:nvCxnSpPr>
         <p:spPr>
           <a:xfrm flipV="1">
-            <a:off x="4508500" y="2644242"/>
-            <a:ext cx="268288" cy="73794"/>
+            <a:off x="4508500" y="2632075"/>
+            <a:ext cx="220663" cy="85961"/>
           </a:xfrm>
           <a:prstGeom prst="straightConnector1">
             <a:avLst/>
@@ -3581,7 +3581,7 @@
         <p:spPr>
           <a:xfrm>
             <a:off x="6137655" y="2156473"/>
-            <a:ext cx="220283" cy="188921"/>
+            <a:ext cx="231395" cy="139093"/>
           </a:xfrm>
           <a:prstGeom prst="straightConnector1">
             <a:avLst/>
@@ -4833,8 +4833,8 @@
         </p:nvCxnSpPr>
         <p:spPr>
           <a:xfrm flipH="1">
-            <a:off x="6889750" y="2562241"/>
-            <a:ext cx="749628" cy="111109"/>
+            <a:off x="6925217" y="2562241"/>
+            <a:ext cx="714161" cy="104759"/>
           </a:xfrm>
           <a:prstGeom prst="straightConnector1">
             <a:avLst/>
@@ -4878,7 +4878,7 @@
         <p:spPr>
           <a:xfrm>
             <a:off x="4508500" y="2164585"/>
-            <a:ext cx="920750" cy="807215"/>
+            <a:ext cx="936625" cy="769115"/>
           </a:xfrm>
           <a:prstGeom prst="straightConnector1">
             <a:avLst/>

</xml_diff>

<commit_message>
Updated Top & Bot annotated pics of PX-HERO board
</commit_message>
<xml_diff>
--- a/doc/images/hero_board/hero_board_bot_annotated.pptx
+++ b/doc/images/hero_board/hero_board_bot_annotated.pptx
@@ -3374,8 +3374,8 @@
         </p:blipFill>
         <p:spPr>
           <a:xfrm>
-            <a:off x="4664022" y="2298836"/>
-            <a:ext cx="2863956" cy="2260328"/>
+            <a:off x="3267904" y="1196975"/>
+            <a:ext cx="5656191" cy="4464050"/>
           </a:xfrm>
           <a:prstGeom prst="rect">
             <a:avLst/>
@@ -3384,10 +3384,10 @@
       </p:pic>
       <p:sp>
         <p:nvSpPr>
-          <p:cNvPr id="6" name="Rectangle 5">
-            <a:extLst>
-              <a:ext uri="{FF2B5EF4-FFF2-40B4-BE49-F238E27FC236}">
-                <a16:creationId xmlns:a16="http://schemas.microsoft.com/office/drawing/2014/main" id="{A9C30CB5-530D-45C4-B8EE-3A76844DAD2F}"/>
+          <p:cNvPr id="33" name="Rectangle 32">
+            <a:extLst>
+              <a:ext uri="{FF2B5EF4-FFF2-40B4-BE49-F238E27FC236}">
+                <a16:creationId xmlns:a16="http://schemas.microsoft.com/office/drawing/2014/main" id="{3B7D9CC7-1390-4DED-B3AD-BCA905357743}"/>
               </a:ext>
             </a:extLst>
           </p:cNvPr>
@@ -3396,16 +3396,14 @@
         </p:nvSpPr>
         <p:spPr>
           <a:xfrm>
-            <a:off x="3476304" y="2546504"/>
-            <a:ext cx="1032196" cy="343064"/>
+            <a:off x="4124271" y="358354"/>
+            <a:ext cx="647370" cy="596047"/>
           </a:xfrm>
           <a:prstGeom prst="rect">
             <a:avLst/>
           </a:prstGeom>
-          <a:solidFill>
-            <a:srgbClr val="EFE5A3"/>
-          </a:solidFill>
-          <a:ln>
+          <a:noFill/>
+          <a:ln w="38100">
             <a:solidFill>
               <a:srgbClr val="C0A820"/>
             </a:solidFill>
@@ -3433,82 +3431,24 @@
           <a:p>
             <a:pPr algn="ctr"/>
             <a:r>
-              <a:rPr lang="en-ZA" sz="800" dirty="0">
+              <a:rPr lang="en-ZA" sz="4400" b="1" dirty="0">
                 <a:solidFill>
                   <a:schemeClr val="tx1"/>
                 </a:solidFill>
                 <a:latin typeface="Segoe UI" panose="020B0502040204020203" pitchFamily="34" charset="0"/>
                 <a:cs typeface="Segoe UI" panose="020B0502040204020203" pitchFamily="34" charset="0"/>
               </a:rPr>
-              <a:t>Li-Po </a:t>
-            </a:r>
-          </a:p>
-          <a:p>
-            <a:pPr algn="ctr"/>
-            <a:r>
-              <a:rPr lang="en-ZA" sz="800" dirty="0">
-                <a:solidFill>
-                  <a:schemeClr val="tx1"/>
-                </a:solidFill>
-                <a:latin typeface="Segoe UI" panose="020B0502040204020203" pitchFamily="34" charset="0"/>
-                <a:cs typeface="Segoe UI" panose="020B0502040204020203" pitchFamily="34" charset="0"/>
-              </a:rPr>
-              <a:t>battery connector</a:t>
-            </a:r>
-          </a:p>
-        </p:txBody>
-      </p:sp>
-      <p:cxnSp>
-        <p:nvCxnSpPr>
-          <p:cNvPr id="8" name="Straight Arrow Connector 7">
-            <a:extLst>
-              <a:ext uri="{FF2B5EF4-FFF2-40B4-BE49-F238E27FC236}">
-                <a16:creationId xmlns:a16="http://schemas.microsoft.com/office/drawing/2014/main" id="{04C03992-2F83-4BE7-A874-ED16FF23CD17}"/>
-              </a:ext>
-            </a:extLst>
-          </p:cNvPr>
-          <p:cNvCxnSpPr>
-            <a:cxnSpLocks/>
-            <a:stCxn id="6" idx="3"/>
-          </p:cNvCxnSpPr>
-          <p:nvPr/>
-        </p:nvCxnSpPr>
-        <p:spPr>
-          <a:xfrm flipV="1">
-            <a:off x="4508500" y="2632075"/>
-            <a:ext cx="220663" cy="85961"/>
-          </a:xfrm>
-          <a:prstGeom prst="straightConnector1">
-            <a:avLst/>
-          </a:prstGeom>
-          <a:ln w="12700">
-            <a:solidFill>
-              <a:srgbClr val="C0A820"/>
-            </a:solidFill>
-            <a:tailEnd type="triangle"/>
-          </a:ln>
-        </p:spPr>
-        <p:style>
-          <a:lnRef idx="1">
-            <a:schemeClr val="accent1"/>
-          </a:lnRef>
-          <a:fillRef idx="0">
-            <a:schemeClr val="accent1"/>
-          </a:fillRef>
-          <a:effectRef idx="0">
-            <a:schemeClr val="accent1"/>
-          </a:effectRef>
-          <a:fontRef idx="minor">
-            <a:schemeClr val="tx1"/>
-          </a:fontRef>
-        </p:style>
-      </p:cxnSp>
-      <p:sp>
-        <p:nvSpPr>
-          <p:cNvPr id="9" name="Rectangle 8">
-            <a:extLst>
-              <a:ext uri="{FF2B5EF4-FFF2-40B4-BE49-F238E27FC236}">
-                <a16:creationId xmlns:a16="http://schemas.microsoft.com/office/drawing/2014/main" id="{6EFC98FC-4CAB-4C17-9DC0-5097E023634C}"/>
+              <a:t>A</a:t>
+            </a:r>
+          </a:p>
+        </p:txBody>
+      </p:sp>
+      <p:sp>
+        <p:nvSpPr>
+          <p:cNvPr id="35" name="Rectangle 34">
+            <a:extLst>
+              <a:ext uri="{FF2B5EF4-FFF2-40B4-BE49-F238E27FC236}">
+                <a16:creationId xmlns:a16="http://schemas.microsoft.com/office/drawing/2014/main" id="{04AED058-B476-4439-BB3C-7BEE0FDCDEFA}"/>
               </a:ext>
             </a:extLst>
           </p:cNvPr>
@@ -3517,14 +3457,14 @@
         </p:nvSpPr>
         <p:spPr>
           <a:xfrm>
-            <a:off x="4609823" y="1863738"/>
-            <a:ext cx="773113" cy="300846"/>
+            <a:off x="5524175" y="358354"/>
+            <a:ext cx="647370" cy="597159"/>
           </a:xfrm>
           <a:prstGeom prst="rect">
             <a:avLst/>
           </a:prstGeom>
           <a:noFill/>
-          <a:ln>
+          <a:ln w="38100">
             <a:solidFill>
               <a:srgbClr val="C0A820"/>
             </a:solidFill>
@@ -3552,41 +3492,43 @@
           <a:p>
             <a:pPr algn="ctr"/>
             <a:r>
-              <a:rPr lang="en-ZA" sz="800" dirty="0">
+              <a:rPr lang="en-ZA" sz="4400" b="1" dirty="0">
                 <a:solidFill>
                   <a:schemeClr val="tx1"/>
                 </a:solidFill>
                 <a:latin typeface="Segoe UI" panose="020B0502040204020203" pitchFamily="34" charset="0"/>
                 <a:cs typeface="Segoe UI" panose="020B0502040204020203" pitchFamily="34" charset="0"/>
               </a:rPr>
-              <a:t>Serial Flash</a:t>
+              <a:t>B</a:t>
             </a:r>
           </a:p>
         </p:txBody>
       </p:sp>
       <p:cxnSp>
         <p:nvCxnSpPr>
-          <p:cNvPr id="10" name="Straight Arrow Connector 9">
-            <a:extLst>
-              <a:ext uri="{FF2B5EF4-FFF2-40B4-BE49-F238E27FC236}">
-                <a16:creationId xmlns:a16="http://schemas.microsoft.com/office/drawing/2014/main" id="{8D44D668-65CE-4681-9B08-CC1E0ADDF353}"/>
+          <p:cNvPr id="36" name="Straight Arrow Connector 35">
+            <a:extLst>
+              <a:ext uri="{FF2B5EF4-FFF2-40B4-BE49-F238E27FC236}">
+                <a16:creationId xmlns:a16="http://schemas.microsoft.com/office/drawing/2014/main" id="{9E734388-A578-47E7-BF86-214E5A9DAAFF}"/>
               </a:ext>
             </a:extLst>
           </p:cNvPr>
           <p:cNvCxnSpPr>
             <a:cxnSpLocks/>
+            <a:stCxn id="35" idx="2"/>
+            <a:endCxn id="5" idx="0"/>
           </p:cNvCxnSpPr>
           <p:nvPr/>
         </p:nvCxnSpPr>
         <p:spPr>
           <a:xfrm>
-            <a:off x="6137655" y="2156473"/>
-            <a:ext cx="231395" cy="139093"/>
+            <a:off x="5847860" y="955513"/>
+            <a:ext cx="248140" cy="241462"/>
           </a:xfrm>
           <a:prstGeom prst="straightConnector1">
             <a:avLst/>
           </a:prstGeom>
-          <a:ln w="12700">
+          <a:ln w="38100">
             <a:solidFill>
               <a:srgbClr val="C0A820"/>
             </a:solidFill>
@@ -3610,10 +3552,10 @@
       </p:cxnSp>
       <p:sp>
         <p:nvSpPr>
-          <p:cNvPr id="12" name="Rectangle 11">
-            <a:extLst>
-              <a:ext uri="{FF2B5EF4-FFF2-40B4-BE49-F238E27FC236}">
-                <a16:creationId xmlns:a16="http://schemas.microsoft.com/office/drawing/2014/main" id="{5708DFCA-48DE-4C9A-8D30-4E6B434E01F0}"/>
+          <p:cNvPr id="38" name="Rectangle 37">
+            <a:extLst>
+              <a:ext uri="{FF2B5EF4-FFF2-40B4-BE49-F238E27FC236}">
+                <a16:creationId xmlns:a16="http://schemas.microsoft.com/office/drawing/2014/main" id="{56B0CCF1-60FF-401E-9DE2-ECEBA8F08FD7}"/>
               </a:ext>
             </a:extLst>
           </p:cNvPr>
@@ -3622,14 +3564,14 @@
         </p:nvSpPr>
         <p:spPr>
           <a:xfrm>
-            <a:off x="5469319" y="1863738"/>
-            <a:ext cx="668336" cy="300846"/>
+            <a:off x="6419685" y="347533"/>
+            <a:ext cx="647370" cy="597159"/>
           </a:xfrm>
           <a:prstGeom prst="rect">
             <a:avLst/>
           </a:prstGeom>
           <a:noFill/>
-          <a:ln>
+          <a:ln w="38100">
             <a:solidFill>
               <a:srgbClr val="C0A820"/>
             </a:solidFill>
@@ -3657,37 +3599,69 @@
           <a:p>
             <a:pPr algn="ctr"/>
             <a:r>
-              <a:rPr lang="en-ZA" sz="800" dirty="0">
+              <a:rPr lang="en-ZA" sz="4400" b="1" dirty="0">
                 <a:solidFill>
                   <a:schemeClr val="tx1"/>
                 </a:solidFill>
                 <a:latin typeface="Segoe UI" panose="020B0502040204020203" pitchFamily="34" charset="0"/>
                 <a:cs typeface="Segoe UI" panose="020B0502040204020203" pitchFamily="34" charset="0"/>
               </a:rPr>
-              <a:t>BOOT</a:t>
-            </a:r>
-          </a:p>
-          <a:p>
-            <a:pPr algn="ctr"/>
-            <a:r>
-              <a:rPr lang="en-ZA" sz="800" dirty="0">
-                <a:solidFill>
-                  <a:schemeClr val="tx1"/>
-                </a:solidFill>
-                <a:latin typeface="Segoe UI" panose="020B0502040204020203" pitchFamily="34" charset="0"/>
-                <a:cs typeface="Segoe UI" panose="020B0502040204020203" pitchFamily="34" charset="0"/>
-              </a:rPr>
-              <a:t>selection</a:t>
-            </a:r>
-          </a:p>
-        </p:txBody>
-      </p:sp>
-      <p:sp>
-        <p:nvSpPr>
-          <p:cNvPr id="13" name="Rectangle 12">
-            <a:extLst>
-              <a:ext uri="{FF2B5EF4-FFF2-40B4-BE49-F238E27FC236}">
-                <a16:creationId xmlns:a16="http://schemas.microsoft.com/office/drawing/2014/main" id="{816F58C9-A573-4D40-BC7C-2724F62C9551}"/>
+              <a:t>C</a:t>
+            </a:r>
+          </a:p>
+        </p:txBody>
+      </p:sp>
+      <p:cxnSp>
+        <p:nvCxnSpPr>
+          <p:cNvPr id="39" name="Straight Arrow Connector 38">
+            <a:extLst>
+              <a:ext uri="{FF2B5EF4-FFF2-40B4-BE49-F238E27FC236}">
+                <a16:creationId xmlns:a16="http://schemas.microsoft.com/office/drawing/2014/main" id="{EEEF5986-C1DC-4A8D-AC9A-253AB999BCA8}"/>
+              </a:ext>
+            </a:extLst>
+          </p:cNvPr>
+          <p:cNvCxnSpPr>
+            <a:cxnSpLocks/>
+            <a:stCxn id="38" idx="2"/>
+          </p:cNvCxnSpPr>
+          <p:nvPr/>
+        </p:nvCxnSpPr>
+        <p:spPr>
+          <a:xfrm>
+            <a:off x="6743370" y="944692"/>
+            <a:ext cx="43260" cy="259411"/>
+          </a:xfrm>
+          <a:prstGeom prst="straightConnector1">
+            <a:avLst/>
+          </a:prstGeom>
+          <a:ln w="38100">
+            <a:solidFill>
+              <a:srgbClr val="C0A820"/>
+            </a:solidFill>
+            <a:tailEnd type="triangle"/>
+          </a:ln>
+        </p:spPr>
+        <p:style>
+          <a:lnRef idx="1">
+            <a:schemeClr val="accent1"/>
+          </a:lnRef>
+          <a:fillRef idx="0">
+            <a:schemeClr val="accent1"/>
+          </a:fillRef>
+          <a:effectRef idx="0">
+            <a:schemeClr val="accent1"/>
+          </a:effectRef>
+          <a:fontRef idx="minor">
+            <a:schemeClr val="tx1"/>
+          </a:fontRef>
+        </p:style>
+      </p:cxnSp>
+      <p:sp>
+        <p:nvSpPr>
+          <p:cNvPr id="41" name="Rectangle 40">
+            <a:extLst>
+              <a:ext uri="{FF2B5EF4-FFF2-40B4-BE49-F238E27FC236}">
+                <a16:creationId xmlns:a16="http://schemas.microsoft.com/office/drawing/2014/main" id="{8C6F41BE-8573-4D58-9DA2-AC118B107E2C}"/>
               </a:ext>
             </a:extLst>
           </p:cNvPr>
@@ -3696,14 +3670,14 @@
         </p:nvSpPr>
         <p:spPr>
           <a:xfrm>
-            <a:off x="6271998" y="1863744"/>
-            <a:ext cx="939958" cy="300839"/>
+            <a:off x="7309669" y="340405"/>
+            <a:ext cx="647370" cy="597159"/>
           </a:xfrm>
           <a:prstGeom prst="rect">
             <a:avLst/>
           </a:prstGeom>
           <a:noFill/>
-          <a:ln>
+          <a:ln w="38100">
             <a:solidFill>
               <a:srgbClr val="C0A820"/>
             </a:solidFill>
@@ -3731,37 +3705,24 @@
           <a:p>
             <a:pPr algn="ctr"/>
             <a:r>
-              <a:rPr lang="en-ZA" sz="800" dirty="0">
+              <a:rPr lang="en-ZA" sz="4400" b="1" dirty="0">
                 <a:solidFill>
                   <a:schemeClr val="tx1"/>
                 </a:solidFill>
                 <a:latin typeface="Segoe UI" panose="020B0502040204020203" pitchFamily="34" charset="0"/>
                 <a:cs typeface="Segoe UI" panose="020B0502040204020203" pitchFamily="34" charset="0"/>
               </a:rPr>
-              <a:t>Prog &amp; Debug</a:t>
-            </a:r>
-          </a:p>
-          <a:p>
-            <a:pPr algn="ctr"/>
-            <a:r>
-              <a:rPr lang="en-ZA" sz="800" dirty="0">
-                <a:solidFill>
-                  <a:schemeClr val="tx1"/>
-                </a:solidFill>
-                <a:latin typeface="Segoe UI" panose="020B0502040204020203" pitchFamily="34" charset="0"/>
-                <a:cs typeface="Segoe UI" panose="020B0502040204020203" pitchFamily="34" charset="0"/>
-              </a:rPr>
-              <a:t>connector</a:t>
-            </a:r>
-          </a:p>
-        </p:txBody>
-      </p:sp>
-      <p:sp>
-        <p:nvSpPr>
-          <p:cNvPr id="14" name="Rectangle 13">
-            <a:extLst>
-              <a:ext uri="{FF2B5EF4-FFF2-40B4-BE49-F238E27FC236}">
-                <a16:creationId xmlns:a16="http://schemas.microsoft.com/office/drawing/2014/main" id="{0F873589-CD98-4364-BC59-554CEC0C8ACD}"/>
+              <a:t>D</a:t>
+            </a:r>
+          </a:p>
+        </p:txBody>
+      </p:sp>
+      <p:sp>
+        <p:nvSpPr>
+          <p:cNvPr id="42" name="Rectangle 41">
+            <a:extLst>
+              <a:ext uri="{FF2B5EF4-FFF2-40B4-BE49-F238E27FC236}">
+                <a16:creationId xmlns:a16="http://schemas.microsoft.com/office/drawing/2014/main" id="{8ED5F3E2-1A03-485F-BF3D-BC539B706DB1}"/>
               </a:ext>
             </a:extLst>
           </p:cNvPr>
@@ -3770,14 +3731,14 @@
         </p:nvSpPr>
         <p:spPr>
           <a:xfrm>
-            <a:off x="7343209" y="1863744"/>
-            <a:ext cx="555397" cy="300840"/>
+            <a:off x="8205179" y="344228"/>
+            <a:ext cx="647370" cy="597159"/>
           </a:xfrm>
           <a:prstGeom prst="rect">
             <a:avLst/>
           </a:prstGeom>
           <a:noFill/>
-          <a:ln>
+          <a:ln w="38100">
             <a:solidFill>
               <a:srgbClr val="C0A820"/>
             </a:solidFill>
@@ -3805,24 +3766,24 @@
           <a:p>
             <a:pPr algn="ctr"/>
             <a:r>
-              <a:rPr lang="en-ZA" sz="800" dirty="0">
+              <a:rPr lang="en-ZA" sz="4400" b="1" dirty="0">
                 <a:solidFill>
                   <a:schemeClr val="tx1"/>
                 </a:solidFill>
                 <a:latin typeface="Segoe UI" panose="020B0502040204020203" pitchFamily="34" charset="0"/>
                 <a:cs typeface="Segoe UI" panose="020B0502040204020203" pitchFamily="34" charset="0"/>
               </a:rPr>
-              <a:t>Reset button</a:t>
-            </a:r>
-          </a:p>
-        </p:txBody>
-      </p:sp>
-      <p:sp>
-        <p:nvSpPr>
-          <p:cNvPr id="15" name="Rectangle 14">
-            <a:extLst>
-              <a:ext uri="{FF2B5EF4-FFF2-40B4-BE49-F238E27FC236}">
-                <a16:creationId xmlns:a16="http://schemas.microsoft.com/office/drawing/2014/main" id="{510AB0E2-3AF2-48E8-B721-FF27B792FA67}"/>
+              <a:t>E</a:t>
+            </a:r>
+          </a:p>
+        </p:txBody>
+      </p:sp>
+      <p:sp>
+        <p:nvSpPr>
+          <p:cNvPr id="44" name="Rectangle 43">
+            <a:extLst>
+              <a:ext uri="{FF2B5EF4-FFF2-40B4-BE49-F238E27FC236}">
+                <a16:creationId xmlns:a16="http://schemas.microsoft.com/office/drawing/2014/main" id="{0288E08B-FBCC-4506-AD65-BC7B95FA3DA4}"/>
               </a:ext>
             </a:extLst>
           </p:cNvPr>
@@ -3831,14 +3792,14 @@
         </p:nvSpPr>
         <p:spPr>
           <a:xfrm>
-            <a:off x="7639378" y="2905998"/>
-            <a:ext cx="1266498" cy="1043062"/>
+            <a:off x="9178784" y="1563946"/>
+            <a:ext cx="647370" cy="597159"/>
           </a:xfrm>
           <a:prstGeom prst="rect">
             <a:avLst/>
           </a:prstGeom>
           <a:noFill/>
-          <a:ln>
+          <a:ln w="38100">
             <a:solidFill>
               <a:srgbClr val="C0A820"/>
             </a:solidFill>
@@ -3864,137 +3825,26 @@
           <a:bodyPr rtlCol="0" anchor="ctr"/>
           <a:lstStyle/>
           <a:p>
-            <a:r>
-              <a:rPr lang="en-ZA" sz="800" b="1" dirty="0">
+            <a:pPr algn="ctr"/>
+            <a:r>
+              <a:rPr lang="en-ZA" sz="4400" b="1" dirty="0">
                 <a:solidFill>
                   <a:schemeClr val="tx1"/>
                 </a:solidFill>
                 <a:latin typeface="Segoe UI" panose="020B0502040204020203" pitchFamily="34" charset="0"/>
                 <a:cs typeface="Segoe UI" panose="020B0502040204020203" pitchFamily="34" charset="0"/>
               </a:rPr>
-              <a:t>Peripheral connector</a:t>
-            </a:r>
-          </a:p>
-          <a:p>
-            <a:pPr marL="171450" indent="-171450">
-              <a:buFont typeface="Arial" panose="020B0604020202020204" pitchFamily="34" charset="0"/>
-              <a:buChar char="•"/>
-            </a:pPr>
-            <a:r>
-              <a:rPr lang="en-ZA" sz="800" dirty="0">
-                <a:solidFill>
-                  <a:schemeClr val="tx1"/>
-                </a:solidFill>
-                <a:latin typeface="Segoe UI" panose="020B0502040204020203" pitchFamily="34" charset="0"/>
-                <a:cs typeface="Segoe UI" panose="020B0502040204020203" pitchFamily="34" charset="0"/>
-              </a:rPr>
-              <a:t>PWR</a:t>
-            </a:r>
-          </a:p>
-          <a:p>
-            <a:pPr marL="171450" indent="-171450">
-              <a:buFont typeface="Arial" panose="020B0604020202020204" pitchFamily="34" charset="0"/>
-              <a:buChar char="•"/>
-            </a:pPr>
-            <a:r>
-              <a:rPr lang="en-ZA" sz="800" dirty="0">
-                <a:solidFill>
-                  <a:schemeClr val="tx1"/>
-                </a:solidFill>
-                <a:latin typeface="Segoe UI" panose="020B0502040204020203" pitchFamily="34" charset="0"/>
-                <a:cs typeface="Segoe UI" panose="020B0502040204020203" pitchFamily="34" charset="0"/>
-              </a:rPr>
-              <a:t>ADC x 4</a:t>
-            </a:r>
-          </a:p>
-          <a:p>
-            <a:pPr marL="171450" indent="-171450">
-              <a:buFont typeface="Arial" panose="020B0604020202020204" pitchFamily="34" charset="0"/>
-              <a:buChar char="•"/>
-            </a:pPr>
-            <a:r>
-              <a:rPr lang="en-ZA" sz="800" dirty="0">
-                <a:solidFill>
-                  <a:schemeClr val="tx1"/>
-                </a:solidFill>
-                <a:latin typeface="Segoe UI" panose="020B0502040204020203" pitchFamily="34" charset="0"/>
-                <a:cs typeface="Segoe UI" panose="020B0502040204020203" pitchFamily="34" charset="0"/>
-              </a:rPr>
-              <a:t>DAC x 1</a:t>
-            </a:r>
-          </a:p>
-          <a:p>
-            <a:pPr marL="171450" indent="-171450">
-              <a:buFont typeface="Arial" panose="020B0604020202020204" pitchFamily="34" charset="0"/>
-              <a:buChar char="•"/>
-            </a:pPr>
-            <a:r>
-              <a:rPr lang="en-ZA" sz="800" dirty="0">
-                <a:solidFill>
-                  <a:schemeClr val="tx1"/>
-                </a:solidFill>
-                <a:latin typeface="Segoe UI" panose="020B0502040204020203" pitchFamily="34" charset="0"/>
-                <a:cs typeface="Segoe UI" panose="020B0502040204020203" pitchFamily="34" charset="0"/>
-              </a:rPr>
-              <a:t>GPIO x 8 / PWM x 4</a:t>
-            </a:r>
-          </a:p>
-          <a:p>
-            <a:pPr marL="171450" indent="-171450">
-              <a:buFont typeface="Arial" panose="020B0604020202020204" pitchFamily="34" charset="0"/>
-              <a:buChar char="•"/>
-            </a:pPr>
-            <a:r>
-              <a:rPr lang="en-ZA" sz="800" dirty="0">
-                <a:solidFill>
-                  <a:schemeClr val="tx1"/>
-                </a:solidFill>
-                <a:latin typeface="Segoe UI" panose="020B0502040204020203" pitchFamily="34" charset="0"/>
-                <a:cs typeface="Segoe UI" panose="020B0502040204020203" pitchFamily="34" charset="0"/>
-              </a:rPr>
-              <a:t>UART x 2</a:t>
-            </a:r>
-          </a:p>
-          <a:p>
-            <a:pPr marL="171450" indent="-171450">
-              <a:buFont typeface="Arial" panose="020B0604020202020204" pitchFamily="34" charset="0"/>
-              <a:buChar char="•"/>
-            </a:pPr>
-            <a:r>
-              <a:rPr lang="en-ZA" sz="800" dirty="0">
-                <a:solidFill>
-                  <a:schemeClr val="tx1"/>
-                </a:solidFill>
-                <a:latin typeface="Segoe UI" panose="020B0502040204020203" pitchFamily="34" charset="0"/>
-                <a:cs typeface="Segoe UI" panose="020B0502040204020203" pitchFamily="34" charset="0"/>
-              </a:rPr>
-              <a:t>I2C x 1</a:t>
-            </a:r>
-          </a:p>
-          <a:p>
-            <a:pPr marL="171450" indent="-171450">
-              <a:buFont typeface="Arial" panose="020B0604020202020204" pitchFamily="34" charset="0"/>
-              <a:buChar char="•"/>
-            </a:pPr>
-            <a:r>
-              <a:rPr lang="en-ZA" sz="800" dirty="0">
-                <a:solidFill>
-                  <a:schemeClr val="tx1"/>
-                </a:solidFill>
-                <a:latin typeface="Segoe UI" panose="020B0502040204020203" pitchFamily="34" charset="0"/>
-                <a:cs typeface="Segoe UI" panose="020B0502040204020203" pitchFamily="34" charset="0"/>
-              </a:rPr>
-              <a:t>SPI x 1</a:t>
-            </a:r>
-          </a:p>
-        </p:txBody>
-      </p:sp>
-      <p:sp>
-        <p:nvSpPr>
-          <p:cNvPr id="16" name="Rectangle 15">
-            <a:extLst>
-              <a:ext uri="{FF2B5EF4-FFF2-40B4-BE49-F238E27FC236}">
-                <a16:creationId xmlns:a16="http://schemas.microsoft.com/office/drawing/2014/main" id="{0EA3715B-32C3-4393-9080-A4C9F59D474C}"/>
+              <a:t>F</a:t>
+            </a:r>
+          </a:p>
+        </p:txBody>
+      </p:sp>
+      <p:sp>
+        <p:nvSpPr>
+          <p:cNvPr id="45" name="Rectangle 44">
+            <a:extLst>
+              <a:ext uri="{FF2B5EF4-FFF2-40B4-BE49-F238E27FC236}">
+                <a16:creationId xmlns:a16="http://schemas.microsoft.com/office/drawing/2014/main" id="{E6D0D2AB-66BB-4718-A4E6-8C62950CDA6E}"/>
               </a:ext>
             </a:extLst>
           </p:cNvPr>
@@ -4003,14 +3853,14 @@
         </p:nvSpPr>
         <p:spPr>
           <a:xfrm>
-            <a:off x="5196257" y="4708111"/>
-            <a:ext cx="682623" cy="292735"/>
+            <a:off x="6537766" y="5883340"/>
+            <a:ext cx="647370" cy="597159"/>
           </a:xfrm>
           <a:prstGeom prst="rect">
             <a:avLst/>
           </a:prstGeom>
           <a:noFill/>
-          <a:ln>
+          <a:ln w="38100">
             <a:solidFill>
               <a:srgbClr val="C0A820"/>
             </a:solidFill>
@@ -4038,24 +3888,24 @@
           <a:p>
             <a:pPr algn="ctr"/>
             <a:r>
-              <a:rPr lang="en-ZA" sz="800" dirty="0">
+              <a:rPr lang="en-ZA" sz="4400" b="1" dirty="0">
                 <a:solidFill>
                   <a:schemeClr val="tx1"/>
                 </a:solidFill>
                 <a:latin typeface="Segoe UI" panose="020B0502040204020203" pitchFamily="34" charset="0"/>
                 <a:cs typeface="Segoe UI" panose="020B0502040204020203" pitchFamily="34" charset="0"/>
               </a:rPr>
-              <a:t>Buzzer</a:t>
-            </a:r>
-          </a:p>
-        </p:txBody>
-      </p:sp>
-      <p:sp>
-        <p:nvSpPr>
-          <p:cNvPr id="17" name="Rectangle 16">
-            <a:extLst>
-              <a:ext uri="{FF2B5EF4-FFF2-40B4-BE49-F238E27FC236}">
-                <a16:creationId xmlns:a16="http://schemas.microsoft.com/office/drawing/2014/main" id="{70FF8969-2578-4FF8-B3D1-CA834D8F9207}"/>
+              <a:t>I</a:t>
+            </a:r>
+          </a:p>
+        </p:txBody>
+      </p:sp>
+      <p:sp>
+        <p:nvSpPr>
+          <p:cNvPr id="47" name="Rectangle 46">
+            <a:extLst>
+              <a:ext uri="{FF2B5EF4-FFF2-40B4-BE49-F238E27FC236}">
+                <a16:creationId xmlns:a16="http://schemas.microsoft.com/office/drawing/2014/main" id="{4FF636DD-1FD1-4908-9A53-B2910D35DD00}"/>
               </a:ext>
             </a:extLst>
           </p:cNvPr>
@@ -4064,14 +3914,14 @@
         </p:nvSpPr>
         <p:spPr>
           <a:xfrm>
-            <a:off x="3476303" y="4025384"/>
-            <a:ext cx="1032197" cy="236534"/>
+            <a:off x="7420361" y="5883340"/>
+            <a:ext cx="647370" cy="597159"/>
           </a:xfrm>
           <a:prstGeom prst="rect">
             <a:avLst/>
           </a:prstGeom>
           <a:noFill/>
-          <a:ln>
+          <a:ln w="38100">
             <a:solidFill>
               <a:srgbClr val="C0A820"/>
             </a:solidFill>
@@ -4099,434 +3949,42 @@
           <a:p>
             <a:pPr algn="ctr"/>
             <a:r>
-              <a:rPr lang="en-ZA" sz="800" dirty="0">
+              <a:rPr lang="en-ZA" sz="4400" b="1" dirty="0">
                 <a:solidFill>
                   <a:schemeClr val="tx1"/>
                 </a:solidFill>
                 <a:latin typeface="Segoe UI" panose="020B0502040204020203" pitchFamily="34" charset="0"/>
                 <a:cs typeface="Segoe UI" panose="020B0502040204020203" pitchFamily="34" charset="0"/>
               </a:rPr>
-              <a:t>MicroSD card</a:t>
-            </a:r>
-          </a:p>
-        </p:txBody>
-      </p:sp>
-      <p:sp>
-        <p:nvSpPr>
-          <p:cNvPr id="18" name="Rectangle 17">
-            <a:extLst>
-              <a:ext uri="{FF2B5EF4-FFF2-40B4-BE49-F238E27FC236}">
-                <a16:creationId xmlns:a16="http://schemas.microsoft.com/office/drawing/2014/main" id="{E0D29A58-DA8C-4A17-B92D-4B79CB1C7F79}"/>
-              </a:ext>
-            </a:extLst>
-          </p:cNvPr>
-          <p:cNvSpPr/>
-          <p:nvPr/>
-        </p:nvSpPr>
-        <p:spPr>
-          <a:xfrm>
-            <a:off x="3476303" y="3590152"/>
-            <a:ext cx="1032197" cy="346393"/>
-          </a:xfrm>
-          <a:prstGeom prst="rect">
-            <a:avLst/>
-          </a:prstGeom>
-          <a:noFill/>
-          <a:ln>
-            <a:solidFill>
-              <a:srgbClr val="C0A820"/>
-            </a:solidFill>
-          </a:ln>
-        </p:spPr>
-        <p:style>
-          <a:lnRef idx="2">
-            <a:schemeClr val="accent1">
-              <a:shade val="50000"/>
-            </a:schemeClr>
-          </a:lnRef>
-          <a:fillRef idx="1">
-            <a:schemeClr val="accent1"/>
-          </a:fillRef>
-          <a:effectRef idx="0">
-            <a:schemeClr val="accent1"/>
-          </a:effectRef>
-          <a:fontRef idx="minor">
-            <a:schemeClr val="lt1"/>
-          </a:fontRef>
-        </p:style>
-        <p:txBody>
-          <a:bodyPr rtlCol="0" anchor="ctr"/>
-          <a:lstStyle/>
-          <a:p>
-            <a:pPr algn="ctr"/>
-            <a:r>
-              <a:rPr lang="en-ZA" sz="800" b="1" dirty="0">
-                <a:solidFill>
-                  <a:schemeClr val="tx1"/>
-                </a:solidFill>
-                <a:latin typeface="Segoe UI" panose="020B0502040204020203" pitchFamily="34" charset="0"/>
-                <a:cs typeface="Segoe UI" panose="020B0502040204020203" pitchFamily="34" charset="0"/>
-              </a:rPr>
-              <a:t>USB1</a:t>
-            </a:r>
-          </a:p>
-          <a:p>
-            <a:pPr algn="ctr"/>
-            <a:r>
-              <a:rPr lang="en-ZA" sz="800" dirty="0">
-                <a:solidFill>
-                  <a:schemeClr val="tx1"/>
-                </a:solidFill>
-                <a:latin typeface="Segoe UI" panose="020B0502040204020203" pitchFamily="34" charset="0"/>
-                <a:cs typeface="Segoe UI" panose="020B0502040204020203" pitchFamily="34" charset="0"/>
-              </a:rPr>
-              <a:t>STM32</a:t>
-            </a:r>
-          </a:p>
-        </p:txBody>
-      </p:sp>
-      <p:sp>
-        <p:nvSpPr>
-          <p:cNvPr id="19" name="Rectangle 18">
-            <a:extLst>
-              <a:ext uri="{FF2B5EF4-FFF2-40B4-BE49-F238E27FC236}">
-                <a16:creationId xmlns:a16="http://schemas.microsoft.com/office/drawing/2014/main" id="{3AEE1236-AF19-41C2-85F7-D192C10C99C0}"/>
-              </a:ext>
-            </a:extLst>
-          </p:cNvPr>
-          <p:cNvSpPr/>
-          <p:nvPr/>
-        </p:nvSpPr>
-        <p:spPr>
-          <a:xfrm>
-            <a:off x="3476303" y="3154920"/>
-            <a:ext cx="1032196" cy="346393"/>
-          </a:xfrm>
-          <a:prstGeom prst="rect">
-            <a:avLst/>
-          </a:prstGeom>
-          <a:solidFill>
-            <a:srgbClr val="EFE5A3"/>
-          </a:solidFill>
-          <a:ln>
-            <a:solidFill>
-              <a:srgbClr val="C0A820"/>
-            </a:solidFill>
-          </a:ln>
-        </p:spPr>
-        <p:style>
-          <a:lnRef idx="2">
-            <a:schemeClr val="accent1">
-              <a:shade val="50000"/>
-            </a:schemeClr>
-          </a:lnRef>
-          <a:fillRef idx="1">
-            <a:schemeClr val="accent1"/>
-          </a:fillRef>
-          <a:effectRef idx="0">
-            <a:schemeClr val="accent1"/>
-          </a:effectRef>
-          <a:fontRef idx="minor">
-            <a:schemeClr val="lt1"/>
-          </a:fontRef>
-        </p:style>
-        <p:txBody>
-          <a:bodyPr rtlCol="0" anchor="ctr"/>
-          <a:lstStyle/>
-          <a:p>
-            <a:pPr algn="ctr"/>
-            <a:r>
-              <a:rPr lang="en-ZA" sz="800" b="1" dirty="0">
-                <a:solidFill>
-                  <a:schemeClr val="tx1"/>
-                </a:solidFill>
-                <a:latin typeface="Segoe UI" panose="020B0502040204020203" pitchFamily="34" charset="0"/>
-                <a:cs typeface="Segoe UI" panose="020B0502040204020203" pitchFamily="34" charset="0"/>
-              </a:rPr>
-              <a:t>USB2</a:t>
-            </a:r>
-          </a:p>
-          <a:p>
-            <a:pPr algn="ctr"/>
-            <a:r>
-              <a:rPr lang="en-ZA" sz="800" dirty="0">
-                <a:solidFill>
-                  <a:schemeClr val="tx1"/>
-                </a:solidFill>
-                <a:latin typeface="Segoe UI" panose="020B0502040204020203" pitchFamily="34" charset="0"/>
-                <a:cs typeface="Segoe UI" panose="020B0502040204020203" pitchFamily="34" charset="0"/>
-              </a:rPr>
-              <a:t>USB-Serial Bridge</a:t>
-            </a:r>
-          </a:p>
-        </p:txBody>
-      </p:sp>
-      <p:sp>
-        <p:nvSpPr>
-          <p:cNvPr id="20" name="Rectangle 19">
-            <a:extLst>
-              <a:ext uri="{FF2B5EF4-FFF2-40B4-BE49-F238E27FC236}">
-                <a16:creationId xmlns:a16="http://schemas.microsoft.com/office/drawing/2014/main" id="{DEDF151B-1056-408A-9CAF-DCE1C11D4899}"/>
-              </a:ext>
-            </a:extLst>
-          </p:cNvPr>
-          <p:cNvSpPr/>
-          <p:nvPr/>
-        </p:nvSpPr>
-        <p:spPr>
-          <a:xfrm>
-            <a:off x="7106297" y="4708111"/>
-            <a:ext cx="732778" cy="292727"/>
-          </a:xfrm>
-          <a:prstGeom prst="rect">
-            <a:avLst/>
-          </a:prstGeom>
-          <a:noFill/>
-          <a:ln>
-            <a:solidFill>
-              <a:srgbClr val="C0A820"/>
-            </a:solidFill>
-          </a:ln>
-        </p:spPr>
-        <p:style>
-          <a:lnRef idx="2">
-            <a:schemeClr val="accent1">
-              <a:shade val="50000"/>
-            </a:schemeClr>
-          </a:lnRef>
-          <a:fillRef idx="1">
-            <a:schemeClr val="accent1"/>
-          </a:fillRef>
-          <a:effectRef idx="0">
-            <a:schemeClr val="accent1"/>
-          </a:effectRef>
-          <a:fontRef idx="minor">
-            <a:schemeClr val="lt1"/>
-          </a:fontRef>
-        </p:style>
-        <p:txBody>
-          <a:bodyPr rtlCol="0" anchor="ctr"/>
-          <a:lstStyle/>
-          <a:p>
-            <a:pPr algn="ctr"/>
-            <a:r>
-              <a:rPr lang="en-ZA" sz="800" dirty="0" err="1">
-                <a:solidFill>
-                  <a:schemeClr val="tx1"/>
-                </a:solidFill>
-                <a:latin typeface="Segoe UI" panose="020B0502040204020203" pitchFamily="34" charset="0"/>
-                <a:cs typeface="Segoe UI" panose="020B0502040204020203" pitchFamily="34" charset="0"/>
-              </a:rPr>
-              <a:t>Seeed</a:t>
-            </a:r>
-            <a:endParaRPr lang="en-ZA" sz="800" dirty="0">
-              <a:solidFill>
-                <a:schemeClr val="tx1"/>
-              </a:solidFill>
-              <a:latin typeface="Segoe UI" panose="020B0502040204020203" pitchFamily="34" charset="0"/>
-              <a:cs typeface="Segoe UI" panose="020B0502040204020203" pitchFamily="34" charset="0"/>
-            </a:endParaRPr>
-          </a:p>
-          <a:p>
-            <a:pPr algn="ctr"/>
-            <a:r>
-              <a:rPr lang="en-ZA" sz="800" b="1" dirty="0">
-                <a:solidFill>
-                  <a:schemeClr val="tx1"/>
-                </a:solidFill>
-                <a:latin typeface="Segoe UI" panose="020B0502040204020203" pitchFamily="34" charset="0"/>
-                <a:cs typeface="Segoe UI" panose="020B0502040204020203" pitchFamily="34" charset="0"/>
-              </a:rPr>
-              <a:t>GROVE I2C</a:t>
-            </a:r>
-          </a:p>
-        </p:txBody>
-      </p:sp>
-      <p:sp>
-        <p:nvSpPr>
-          <p:cNvPr id="21" name="Rectangle 20">
-            <a:extLst>
-              <a:ext uri="{FF2B5EF4-FFF2-40B4-BE49-F238E27FC236}">
-                <a16:creationId xmlns:a16="http://schemas.microsoft.com/office/drawing/2014/main" id="{7DFCA3A0-F3FD-43E4-A031-888C83C69F89}"/>
-              </a:ext>
-            </a:extLst>
-          </p:cNvPr>
-          <p:cNvSpPr/>
-          <p:nvPr/>
-        </p:nvSpPr>
-        <p:spPr>
-          <a:xfrm>
-            <a:off x="6053138" y="4701527"/>
-            <a:ext cx="879347" cy="299311"/>
-          </a:xfrm>
-          <a:prstGeom prst="rect">
-            <a:avLst/>
-          </a:prstGeom>
-          <a:noFill/>
-          <a:ln>
-            <a:solidFill>
-              <a:srgbClr val="C0A820"/>
-            </a:solidFill>
-          </a:ln>
-        </p:spPr>
-        <p:style>
-          <a:lnRef idx="2">
-            <a:schemeClr val="accent1">
-              <a:shade val="50000"/>
-            </a:schemeClr>
-          </a:lnRef>
-          <a:fillRef idx="1">
-            <a:schemeClr val="accent1"/>
-          </a:fillRef>
-          <a:effectRef idx="0">
-            <a:schemeClr val="accent1"/>
-          </a:effectRef>
-          <a:fontRef idx="minor">
-            <a:schemeClr val="lt1"/>
-          </a:fontRef>
-        </p:style>
-        <p:txBody>
-          <a:bodyPr rtlCol="0" anchor="ctr"/>
-          <a:lstStyle/>
-          <a:p>
-            <a:pPr algn="ctr"/>
-            <a:r>
-              <a:rPr lang="en-ZA" sz="800" dirty="0" err="1">
-                <a:solidFill>
-                  <a:schemeClr val="tx1"/>
-                </a:solidFill>
-                <a:latin typeface="Segoe UI" panose="020B0502040204020203" pitchFamily="34" charset="0"/>
-                <a:cs typeface="Segoe UI" panose="020B0502040204020203" pitchFamily="34" charset="0"/>
-              </a:rPr>
-              <a:t>Sparkfun</a:t>
-            </a:r>
-            <a:r>
-              <a:rPr lang="en-ZA" sz="800" dirty="0">
-                <a:solidFill>
-                  <a:schemeClr val="tx1"/>
-                </a:solidFill>
-                <a:latin typeface="Segoe UI" panose="020B0502040204020203" pitchFamily="34" charset="0"/>
-                <a:cs typeface="Segoe UI" panose="020B0502040204020203" pitchFamily="34" charset="0"/>
-              </a:rPr>
-              <a:t> </a:t>
-            </a:r>
-            <a:r>
-              <a:rPr lang="en-ZA" sz="800" b="1" dirty="0" err="1">
-                <a:solidFill>
-                  <a:schemeClr val="tx1"/>
-                </a:solidFill>
-                <a:latin typeface="Segoe UI" panose="020B0502040204020203" pitchFamily="34" charset="0"/>
-                <a:cs typeface="Segoe UI" panose="020B0502040204020203" pitchFamily="34" charset="0"/>
-              </a:rPr>
-              <a:t>Qwiic</a:t>
-            </a:r>
-            <a:endParaRPr lang="en-ZA" sz="800" b="1" dirty="0">
-              <a:solidFill>
-                <a:schemeClr val="tx1"/>
-              </a:solidFill>
-              <a:latin typeface="Segoe UI" panose="020B0502040204020203" pitchFamily="34" charset="0"/>
-              <a:cs typeface="Segoe UI" panose="020B0502040204020203" pitchFamily="34" charset="0"/>
-            </a:endParaRPr>
-          </a:p>
-          <a:p>
-            <a:pPr algn="ctr"/>
-            <a:r>
-              <a:rPr lang="en-ZA" sz="800" b="1" dirty="0">
-                <a:solidFill>
-                  <a:schemeClr val="tx1"/>
-                </a:solidFill>
-                <a:latin typeface="Segoe UI" panose="020B0502040204020203" pitchFamily="34" charset="0"/>
-                <a:cs typeface="Segoe UI" panose="020B0502040204020203" pitchFamily="34" charset="0"/>
-              </a:rPr>
-              <a:t>STEMMA QT</a:t>
-            </a:r>
-          </a:p>
-        </p:txBody>
-      </p:sp>
-      <p:sp>
-        <p:nvSpPr>
-          <p:cNvPr id="22" name="Rectangle 21">
-            <a:extLst>
-              <a:ext uri="{FF2B5EF4-FFF2-40B4-BE49-F238E27FC236}">
-                <a16:creationId xmlns:a16="http://schemas.microsoft.com/office/drawing/2014/main" id="{1A1FF4DE-E9CE-4010-AA20-A6E22A7353D2}"/>
-              </a:ext>
-            </a:extLst>
-          </p:cNvPr>
-          <p:cNvSpPr/>
-          <p:nvPr/>
-        </p:nvSpPr>
-        <p:spPr>
-          <a:xfrm>
-            <a:off x="3476304" y="1863738"/>
-            <a:ext cx="1032195" cy="300848"/>
-          </a:xfrm>
-          <a:prstGeom prst="rect">
-            <a:avLst/>
-          </a:prstGeom>
-          <a:noFill/>
-          <a:ln>
-            <a:solidFill>
-              <a:srgbClr val="C0A820"/>
-            </a:solidFill>
-          </a:ln>
-        </p:spPr>
-        <p:style>
-          <a:lnRef idx="2">
-            <a:schemeClr val="accent1">
-              <a:shade val="50000"/>
-            </a:schemeClr>
-          </a:lnRef>
-          <a:fillRef idx="1">
-            <a:schemeClr val="accent1"/>
-          </a:fillRef>
-          <a:effectRef idx="0">
-            <a:schemeClr val="accent1"/>
-          </a:effectRef>
-          <a:fontRef idx="minor">
-            <a:schemeClr val="lt1"/>
-          </a:fontRef>
-        </p:style>
-        <p:txBody>
-          <a:bodyPr rtlCol="0" anchor="ctr"/>
-          <a:lstStyle/>
-          <a:p>
-            <a:pPr algn="ctr"/>
-            <a:r>
-              <a:rPr lang="en-ZA" sz="800" dirty="0">
-                <a:solidFill>
-                  <a:schemeClr val="tx1"/>
-                </a:solidFill>
-                <a:latin typeface="Segoe UI" panose="020B0502040204020203" pitchFamily="34" charset="0"/>
-                <a:cs typeface="Segoe UI" panose="020B0502040204020203" pitchFamily="34" charset="0"/>
-              </a:rPr>
-              <a:t>+3V3 step-down DC-DC regulator</a:t>
+              <a:t>H</a:t>
             </a:r>
           </a:p>
         </p:txBody>
       </p:sp>
       <p:cxnSp>
         <p:nvCxnSpPr>
-          <p:cNvPr id="23" name="Straight Arrow Connector 22">
-            <a:extLst>
-              <a:ext uri="{FF2B5EF4-FFF2-40B4-BE49-F238E27FC236}">
-                <a16:creationId xmlns:a16="http://schemas.microsoft.com/office/drawing/2014/main" id="{964D4BBF-B519-4C2C-8A2B-2101617E416A}"/>
+          <p:cNvPr id="48" name="Straight Arrow Connector 47">
+            <a:extLst>
+              <a:ext uri="{FF2B5EF4-FFF2-40B4-BE49-F238E27FC236}">
+                <a16:creationId xmlns:a16="http://schemas.microsoft.com/office/drawing/2014/main" id="{DD33C076-847B-467C-9BDC-27AEC5F49FEB}"/>
               </a:ext>
             </a:extLst>
           </p:cNvPr>
           <p:cNvCxnSpPr>
             <a:cxnSpLocks/>
+            <a:stCxn id="41" idx="2"/>
           </p:cNvCxnSpPr>
           <p:nvPr/>
         </p:nvCxnSpPr>
         <p:spPr>
           <a:xfrm flipH="1">
-            <a:off x="7510464" y="3450511"/>
-            <a:ext cx="128914" cy="1"/>
+            <a:off x="7498668" y="937564"/>
+            <a:ext cx="134686" cy="266539"/>
           </a:xfrm>
           <a:prstGeom prst="straightConnector1">
             <a:avLst/>
           </a:prstGeom>
-          <a:ln w="12700">
+          <a:ln w="38100">
             <a:solidFill>
               <a:srgbClr val="C0A820"/>
             </a:solidFill>
@@ -4550,28 +4008,28 @@
       </p:cxnSp>
       <p:cxnSp>
         <p:nvCxnSpPr>
-          <p:cNvPr id="34" name="Straight Arrow Connector 33">
-            <a:extLst>
-              <a:ext uri="{FF2B5EF4-FFF2-40B4-BE49-F238E27FC236}">
-                <a16:creationId xmlns:a16="http://schemas.microsoft.com/office/drawing/2014/main" id="{7B80DC16-BA41-48E7-940C-E2F9E7BC0C2D}"/>
+          <p:cNvPr id="50" name="Straight Arrow Connector 49">
+            <a:extLst>
+              <a:ext uri="{FF2B5EF4-FFF2-40B4-BE49-F238E27FC236}">
+                <a16:creationId xmlns:a16="http://schemas.microsoft.com/office/drawing/2014/main" id="{F466C51D-8D81-47BB-8A59-8503B0F60E3F}"/>
               </a:ext>
             </a:extLst>
           </p:cNvPr>
           <p:cNvCxnSpPr>
             <a:cxnSpLocks/>
-            <a:stCxn id="19" idx="3"/>
+            <a:stCxn id="42" idx="2"/>
           </p:cNvCxnSpPr>
           <p:nvPr/>
         </p:nvCxnSpPr>
         <p:spPr>
-          <a:xfrm>
-            <a:off x="4508499" y="3328117"/>
-            <a:ext cx="142241" cy="0"/>
+          <a:xfrm flipH="1">
+            <a:off x="8275198" y="941387"/>
+            <a:ext cx="253666" cy="259411"/>
           </a:xfrm>
           <a:prstGeom prst="straightConnector1">
             <a:avLst/>
           </a:prstGeom>
-          <a:ln w="12700">
+          <a:ln w="38100">
             <a:solidFill>
               <a:srgbClr val="C0A820"/>
             </a:solidFill>
@@ -4595,28 +4053,28 @@
       </p:cxnSp>
       <p:cxnSp>
         <p:nvCxnSpPr>
-          <p:cNvPr id="37" name="Straight Arrow Connector 36">
-            <a:extLst>
-              <a:ext uri="{FF2B5EF4-FFF2-40B4-BE49-F238E27FC236}">
-                <a16:creationId xmlns:a16="http://schemas.microsoft.com/office/drawing/2014/main" id="{4D5F3A42-F5F6-4CD1-9960-B2E53CE48E10}"/>
+          <p:cNvPr id="51" name="Straight Arrow Connector 50">
+            <a:extLst>
+              <a:ext uri="{FF2B5EF4-FFF2-40B4-BE49-F238E27FC236}">
+                <a16:creationId xmlns:a16="http://schemas.microsoft.com/office/drawing/2014/main" id="{FEBC271E-56FD-41BD-BE92-AF6459646C96}"/>
               </a:ext>
             </a:extLst>
           </p:cNvPr>
           <p:cNvCxnSpPr>
             <a:cxnSpLocks/>
-            <a:stCxn id="18" idx="3"/>
+            <a:stCxn id="44" idx="1"/>
           </p:cNvCxnSpPr>
           <p:nvPr/>
         </p:nvCxnSpPr>
         <p:spPr>
-          <a:xfrm flipV="1">
-            <a:off x="4508500" y="3682387"/>
-            <a:ext cx="142240" cy="80962"/>
+          <a:xfrm flipH="1">
+            <a:off x="7744046" y="1862526"/>
+            <a:ext cx="1434738" cy="0"/>
           </a:xfrm>
           <a:prstGeom prst="straightConnector1">
             <a:avLst/>
           </a:prstGeom>
-          <a:ln w="12700">
+          <a:ln w="38100">
             <a:solidFill>
               <a:srgbClr val="C0A820"/>
             </a:solidFill>
@@ -4640,28 +4098,28 @@
       </p:cxnSp>
       <p:cxnSp>
         <p:nvCxnSpPr>
-          <p:cNvPr id="40" name="Straight Arrow Connector 39">
-            <a:extLst>
-              <a:ext uri="{FF2B5EF4-FFF2-40B4-BE49-F238E27FC236}">
-                <a16:creationId xmlns:a16="http://schemas.microsoft.com/office/drawing/2014/main" id="{6DAF2808-4C8E-4D52-A9AC-F997E9F8A2C1}"/>
+          <p:cNvPr id="52" name="Straight Arrow Connector 51">
+            <a:extLst>
+              <a:ext uri="{FF2B5EF4-FFF2-40B4-BE49-F238E27FC236}">
+                <a16:creationId xmlns:a16="http://schemas.microsoft.com/office/drawing/2014/main" id="{96B99F88-227F-4B68-BB26-DCC6EE26E4A3}"/>
               </a:ext>
             </a:extLst>
           </p:cNvPr>
           <p:cNvCxnSpPr>
             <a:cxnSpLocks/>
-            <a:stCxn id="17" idx="3"/>
+            <a:stCxn id="45" idx="0"/>
           </p:cNvCxnSpPr>
           <p:nvPr/>
         </p:nvCxnSpPr>
         <p:spPr>
-          <a:xfrm>
-            <a:off x="4508500" y="4143651"/>
-            <a:ext cx="220663" cy="0"/>
+          <a:xfrm flipV="1">
+            <a:off x="6861451" y="5553512"/>
+            <a:ext cx="0" cy="329828"/>
           </a:xfrm>
           <a:prstGeom prst="straightConnector1">
             <a:avLst/>
           </a:prstGeom>
-          <a:ln w="12700">
+          <a:ln w="38100">
             <a:solidFill>
               <a:srgbClr val="C0A820"/>
             </a:solidFill>
@@ -4685,27 +4143,28 @@
       </p:cxnSp>
       <p:cxnSp>
         <p:nvCxnSpPr>
-          <p:cNvPr id="43" name="Straight Arrow Connector 42">
-            <a:extLst>
-              <a:ext uri="{FF2B5EF4-FFF2-40B4-BE49-F238E27FC236}">
-                <a16:creationId xmlns:a16="http://schemas.microsoft.com/office/drawing/2014/main" id="{5295B4AF-DDB6-4A37-8367-A1D09B266AEF}"/>
+          <p:cNvPr id="53" name="Straight Arrow Connector 52">
+            <a:extLst>
+              <a:ext uri="{FF2B5EF4-FFF2-40B4-BE49-F238E27FC236}">
+                <a16:creationId xmlns:a16="http://schemas.microsoft.com/office/drawing/2014/main" id="{AE215835-DF02-4874-8BFF-692C23DF8760}"/>
               </a:ext>
             </a:extLst>
           </p:cNvPr>
           <p:cNvCxnSpPr>
             <a:cxnSpLocks/>
+            <a:stCxn id="47" idx="0"/>
           </p:cNvCxnSpPr>
           <p:nvPr/>
         </p:nvCxnSpPr>
         <p:spPr>
           <a:xfrm flipV="1">
-            <a:off x="5878880" y="4550380"/>
-            <a:ext cx="93481" cy="157731"/>
+            <a:off x="7744046" y="5553512"/>
+            <a:ext cx="0" cy="329828"/>
           </a:xfrm>
           <a:prstGeom prst="straightConnector1">
             <a:avLst/>
           </a:prstGeom>
-          <a:ln w="12700">
+          <a:ln w="38100">
             <a:solidFill>
               <a:srgbClr val="C0A820"/>
             </a:solidFill>
@@ -4729,28 +4188,529 @@
       </p:cxnSp>
       <p:cxnSp>
         <p:nvCxnSpPr>
-          <p:cNvPr id="46" name="Straight Arrow Connector 45">
-            <a:extLst>
-              <a:ext uri="{FF2B5EF4-FFF2-40B4-BE49-F238E27FC236}">
-                <a16:creationId xmlns:a16="http://schemas.microsoft.com/office/drawing/2014/main" id="{723804EC-4A06-4036-95DD-88AE59217575}"/>
+          <p:cNvPr id="55" name="Straight Arrow Connector 54">
+            <a:extLst>
+              <a:ext uri="{FF2B5EF4-FFF2-40B4-BE49-F238E27FC236}">
+                <a16:creationId xmlns:a16="http://schemas.microsoft.com/office/drawing/2014/main" id="{56700165-A9B8-4D42-AC42-DFEB71BCC174}"/>
               </a:ext>
             </a:extLst>
           </p:cNvPr>
           <p:cNvCxnSpPr>
             <a:cxnSpLocks/>
-            <a:stCxn id="21" idx="0"/>
+            <a:stCxn id="33" idx="2"/>
           </p:cNvCxnSpPr>
           <p:nvPr/>
         </p:nvCxnSpPr>
         <p:spPr>
-          <a:xfrm flipV="1">
-            <a:off x="6492812" y="4550381"/>
-            <a:ext cx="13683" cy="151146"/>
+          <a:xfrm>
+            <a:off x="4447956" y="954401"/>
+            <a:ext cx="385589" cy="1527542"/>
           </a:xfrm>
           <a:prstGeom prst="straightConnector1">
             <a:avLst/>
           </a:prstGeom>
-          <a:ln w="12700">
+          <a:ln w="38100">
+            <a:solidFill>
+              <a:srgbClr val="C0A820"/>
+            </a:solidFill>
+            <a:tailEnd type="triangle"/>
+          </a:ln>
+        </p:spPr>
+        <p:style>
+          <a:lnRef idx="1">
+            <a:schemeClr val="accent1"/>
+          </a:lnRef>
+          <a:fillRef idx="0">
+            <a:schemeClr val="accent1"/>
+          </a:fillRef>
+          <a:effectRef idx="0">
+            <a:schemeClr val="accent1"/>
+          </a:effectRef>
+          <a:fontRef idx="minor">
+            <a:schemeClr val="tx1"/>
+          </a:fontRef>
+        </p:style>
+      </p:cxnSp>
+      <p:sp>
+        <p:nvSpPr>
+          <p:cNvPr id="65" name="Rectangle 64">
+            <a:extLst>
+              <a:ext uri="{FF2B5EF4-FFF2-40B4-BE49-F238E27FC236}">
+                <a16:creationId xmlns:a16="http://schemas.microsoft.com/office/drawing/2014/main" id="{BCA1C6CA-9584-4439-946B-880CB03FDA2F}"/>
+              </a:ext>
+            </a:extLst>
+          </p:cNvPr>
+          <p:cNvSpPr/>
+          <p:nvPr/>
+        </p:nvSpPr>
+        <p:spPr>
+          <a:xfrm>
+            <a:off x="9178784" y="3031963"/>
+            <a:ext cx="647370" cy="597159"/>
+          </a:xfrm>
+          <a:prstGeom prst="rect">
+            <a:avLst/>
+          </a:prstGeom>
+          <a:noFill/>
+          <a:ln w="38100">
+            <a:solidFill>
+              <a:srgbClr val="C0A820"/>
+            </a:solidFill>
+          </a:ln>
+        </p:spPr>
+        <p:style>
+          <a:lnRef idx="2">
+            <a:schemeClr val="accent1">
+              <a:shade val="50000"/>
+            </a:schemeClr>
+          </a:lnRef>
+          <a:fillRef idx="1">
+            <a:schemeClr val="accent1"/>
+          </a:fillRef>
+          <a:effectRef idx="0">
+            <a:schemeClr val="accent1"/>
+          </a:effectRef>
+          <a:fontRef idx="minor">
+            <a:schemeClr val="lt1"/>
+          </a:fontRef>
+        </p:style>
+        <p:txBody>
+          <a:bodyPr rtlCol="0" anchor="ctr"/>
+          <a:lstStyle/>
+          <a:p>
+            <a:pPr algn="ctr"/>
+            <a:r>
+              <a:rPr lang="en-ZA" sz="4400" b="1" dirty="0">
+                <a:solidFill>
+                  <a:schemeClr val="tx1"/>
+                </a:solidFill>
+                <a:latin typeface="Segoe UI" panose="020B0502040204020203" pitchFamily="34" charset="0"/>
+                <a:cs typeface="Segoe UI" panose="020B0502040204020203" pitchFamily="34" charset="0"/>
+              </a:rPr>
+              <a:t>G</a:t>
+            </a:r>
+          </a:p>
+        </p:txBody>
+      </p:sp>
+      <p:cxnSp>
+        <p:nvCxnSpPr>
+          <p:cNvPr id="67" name="Straight Arrow Connector 66">
+            <a:extLst>
+              <a:ext uri="{FF2B5EF4-FFF2-40B4-BE49-F238E27FC236}">
+                <a16:creationId xmlns:a16="http://schemas.microsoft.com/office/drawing/2014/main" id="{534B6C53-8A72-4E69-8A05-2A082653727C}"/>
+              </a:ext>
+            </a:extLst>
+          </p:cNvPr>
+          <p:cNvCxnSpPr>
+            <a:cxnSpLocks/>
+            <a:stCxn id="65" idx="1"/>
+          </p:cNvCxnSpPr>
+          <p:nvPr/>
+        </p:nvCxnSpPr>
+        <p:spPr>
+          <a:xfrm flipH="1" flipV="1">
+            <a:off x="8872479" y="3330542"/>
+            <a:ext cx="306305" cy="1"/>
+          </a:xfrm>
+          <a:prstGeom prst="straightConnector1">
+            <a:avLst/>
+          </a:prstGeom>
+          <a:ln w="38100">
+            <a:solidFill>
+              <a:srgbClr val="C0A820"/>
+            </a:solidFill>
+            <a:tailEnd type="triangle"/>
+          </a:ln>
+        </p:spPr>
+        <p:style>
+          <a:lnRef idx="1">
+            <a:schemeClr val="accent1"/>
+          </a:lnRef>
+          <a:fillRef idx="0">
+            <a:schemeClr val="accent1"/>
+          </a:fillRef>
+          <a:effectRef idx="0">
+            <a:schemeClr val="accent1"/>
+          </a:effectRef>
+          <a:fontRef idx="minor">
+            <a:schemeClr val="tx1"/>
+          </a:fontRef>
+        </p:style>
+      </p:cxnSp>
+      <p:sp>
+        <p:nvSpPr>
+          <p:cNvPr id="71" name="Rectangle 70">
+            <a:extLst>
+              <a:ext uri="{FF2B5EF4-FFF2-40B4-BE49-F238E27FC236}">
+                <a16:creationId xmlns:a16="http://schemas.microsoft.com/office/drawing/2014/main" id="{111E652A-926C-4AD6-ABA3-04AC316270EA}"/>
+              </a:ext>
+            </a:extLst>
+          </p:cNvPr>
+          <p:cNvSpPr/>
+          <p:nvPr/>
+        </p:nvSpPr>
+        <p:spPr>
+          <a:xfrm>
+            <a:off x="5655172" y="5883339"/>
+            <a:ext cx="647370" cy="597159"/>
+          </a:xfrm>
+          <a:prstGeom prst="rect">
+            <a:avLst/>
+          </a:prstGeom>
+          <a:noFill/>
+          <a:ln w="38100">
+            <a:solidFill>
+              <a:srgbClr val="C0A820"/>
+            </a:solidFill>
+          </a:ln>
+        </p:spPr>
+        <p:style>
+          <a:lnRef idx="2">
+            <a:schemeClr val="accent1">
+              <a:shade val="50000"/>
+            </a:schemeClr>
+          </a:lnRef>
+          <a:fillRef idx="1">
+            <a:schemeClr val="accent1"/>
+          </a:fillRef>
+          <a:effectRef idx="0">
+            <a:schemeClr val="accent1"/>
+          </a:effectRef>
+          <a:fontRef idx="minor">
+            <a:schemeClr val="lt1"/>
+          </a:fontRef>
+        </p:style>
+        <p:txBody>
+          <a:bodyPr rtlCol="0" anchor="ctr"/>
+          <a:lstStyle/>
+          <a:p>
+            <a:pPr algn="ctr"/>
+            <a:r>
+              <a:rPr lang="en-ZA" sz="4400" b="1" dirty="0">
+                <a:solidFill>
+                  <a:schemeClr val="tx1"/>
+                </a:solidFill>
+                <a:latin typeface="Segoe UI" panose="020B0502040204020203" pitchFamily="34" charset="0"/>
+                <a:cs typeface="Segoe UI" panose="020B0502040204020203" pitchFamily="34" charset="0"/>
+              </a:rPr>
+              <a:t>J</a:t>
+            </a:r>
+          </a:p>
+        </p:txBody>
+      </p:sp>
+      <p:cxnSp>
+        <p:nvCxnSpPr>
+          <p:cNvPr id="72" name="Straight Arrow Connector 71">
+            <a:extLst>
+              <a:ext uri="{FF2B5EF4-FFF2-40B4-BE49-F238E27FC236}">
+                <a16:creationId xmlns:a16="http://schemas.microsoft.com/office/drawing/2014/main" id="{D99E910E-2887-4354-9D82-6805B35367A2}"/>
+              </a:ext>
+            </a:extLst>
+          </p:cNvPr>
+          <p:cNvCxnSpPr>
+            <a:cxnSpLocks/>
+            <a:stCxn id="71" idx="0"/>
+          </p:cNvCxnSpPr>
+          <p:nvPr/>
+        </p:nvCxnSpPr>
+        <p:spPr>
+          <a:xfrm flipV="1">
+            <a:off x="5978857" y="5553512"/>
+            <a:ext cx="0" cy="329827"/>
+          </a:xfrm>
+          <a:prstGeom prst="straightConnector1">
+            <a:avLst/>
+          </a:prstGeom>
+          <a:ln w="38100">
+            <a:solidFill>
+              <a:srgbClr val="C0A820"/>
+            </a:solidFill>
+            <a:tailEnd type="triangle"/>
+          </a:ln>
+        </p:spPr>
+        <p:style>
+          <a:lnRef idx="1">
+            <a:schemeClr val="accent1"/>
+          </a:lnRef>
+          <a:fillRef idx="0">
+            <a:schemeClr val="accent1"/>
+          </a:fillRef>
+          <a:effectRef idx="0">
+            <a:schemeClr val="accent1"/>
+          </a:effectRef>
+          <a:fontRef idx="minor">
+            <a:schemeClr val="tx1"/>
+          </a:fontRef>
+        </p:style>
+      </p:cxnSp>
+      <p:sp>
+        <p:nvSpPr>
+          <p:cNvPr id="77" name="Rectangle 76">
+            <a:extLst>
+              <a:ext uri="{FF2B5EF4-FFF2-40B4-BE49-F238E27FC236}">
+                <a16:creationId xmlns:a16="http://schemas.microsoft.com/office/drawing/2014/main" id="{718A4A27-F614-48EA-AD1F-C70EBF9FDE8C}"/>
+              </a:ext>
+            </a:extLst>
+          </p:cNvPr>
+          <p:cNvSpPr/>
+          <p:nvPr/>
+        </p:nvSpPr>
+        <p:spPr>
+          <a:xfrm>
+            <a:off x="2365846" y="4565293"/>
+            <a:ext cx="647370" cy="597159"/>
+          </a:xfrm>
+          <a:prstGeom prst="rect">
+            <a:avLst/>
+          </a:prstGeom>
+          <a:noFill/>
+          <a:ln w="38100">
+            <a:solidFill>
+              <a:srgbClr val="C0A820"/>
+            </a:solidFill>
+          </a:ln>
+        </p:spPr>
+        <p:style>
+          <a:lnRef idx="2">
+            <a:schemeClr val="accent1">
+              <a:shade val="50000"/>
+            </a:schemeClr>
+          </a:lnRef>
+          <a:fillRef idx="1">
+            <a:schemeClr val="accent1"/>
+          </a:fillRef>
+          <a:effectRef idx="0">
+            <a:schemeClr val="accent1"/>
+          </a:effectRef>
+          <a:fontRef idx="minor">
+            <a:schemeClr val="lt1"/>
+          </a:fontRef>
+        </p:style>
+        <p:txBody>
+          <a:bodyPr rtlCol="0" anchor="ctr"/>
+          <a:lstStyle/>
+          <a:p>
+            <a:pPr algn="ctr"/>
+            <a:r>
+              <a:rPr lang="en-ZA" sz="4400" b="1" dirty="0">
+                <a:solidFill>
+                  <a:schemeClr val="tx1"/>
+                </a:solidFill>
+                <a:latin typeface="Segoe UI" panose="020B0502040204020203" pitchFamily="34" charset="0"/>
+                <a:cs typeface="Segoe UI" panose="020B0502040204020203" pitchFamily="34" charset="0"/>
+              </a:rPr>
+              <a:t>K</a:t>
+            </a:r>
+          </a:p>
+        </p:txBody>
+      </p:sp>
+      <p:sp>
+        <p:nvSpPr>
+          <p:cNvPr id="79" name="Rectangle 78">
+            <a:extLst>
+              <a:ext uri="{FF2B5EF4-FFF2-40B4-BE49-F238E27FC236}">
+                <a16:creationId xmlns:a16="http://schemas.microsoft.com/office/drawing/2014/main" id="{0FCC17EC-D98A-46A8-B70A-12816B59F882}"/>
+              </a:ext>
+            </a:extLst>
+          </p:cNvPr>
+          <p:cNvSpPr/>
+          <p:nvPr/>
+        </p:nvSpPr>
+        <p:spPr>
+          <a:xfrm>
+            <a:off x="2365846" y="3778412"/>
+            <a:ext cx="647370" cy="597159"/>
+          </a:xfrm>
+          <a:prstGeom prst="rect">
+            <a:avLst/>
+          </a:prstGeom>
+          <a:noFill/>
+          <a:ln w="38100">
+            <a:solidFill>
+              <a:srgbClr val="C0A820"/>
+            </a:solidFill>
+          </a:ln>
+        </p:spPr>
+        <p:style>
+          <a:lnRef idx="2">
+            <a:schemeClr val="accent1">
+              <a:shade val="50000"/>
+            </a:schemeClr>
+          </a:lnRef>
+          <a:fillRef idx="1">
+            <a:schemeClr val="accent1"/>
+          </a:fillRef>
+          <a:effectRef idx="0">
+            <a:schemeClr val="accent1"/>
+          </a:effectRef>
+          <a:fontRef idx="minor">
+            <a:schemeClr val="lt1"/>
+          </a:fontRef>
+        </p:style>
+        <p:txBody>
+          <a:bodyPr rtlCol="0" anchor="ctr"/>
+          <a:lstStyle/>
+          <a:p>
+            <a:pPr algn="ctr"/>
+            <a:r>
+              <a:rPr lang="en-ZA" sz="4400" b="1" dirty="0">
+                <a:solidFill>
+                  <a:schemeClr val="tx1"/>
+                </a:solidFill>
+                <a:latin typeface="Segoe UI" panose="020B0502040204020203" pitchFamily="34" charset="0"/>
+                <a:cs typeface="Segoe UI" panose="020B0502040204020203" pitchFamily="34" charset="0"/>
+              </a:rPr>
+              <a:t>L</a:t>
+            </a:r>
+          </a:p>
+        </p:txBody>
+      </p:sp>
+      <p:sp>
+        <p:nvSpPr>
+          <p:cNvPr id="80" name="Rectangle 79">
+            <a:extLst>
+              <a:ext uri="{FF2B5EF4-FFF2-40B4-BE49-F238E27FC236}">
+                <a16:creationId xmlns:a16="http://schemas.microsoft.com/office/drawing/2014/main" id="{34C6FCE7-86B9-4198-82F6-0419CC8759E0}"/>
+              </a:ext>
+            </a:extLst>
+          </p:cNvPr>
+          <p:cNvSpPr/>
+          <p:nvPr/>
+        </p:nvSpPr>
+        <p:spPr>
+          <a:xfrm>
+            <a:off x="2365846" y="2986866"/>
+            <a:ext cx="647370" cy="597159"/>
+          </a:xfrm>
+          <a:prstGeom prst="rect">
+            <a:avLst/>
+          </a:prstGeom>
+          <a:noFill/>
+          <a:ln w="38100">
+            <a:solidFill>
+              <a:srgbClr val="C0A820"/>
+            </a:solidFill>
+          </a:ln>
+        </p:spPr>
+        <p:style>
+          <a:lnRef idx="2">
+            <a:schemeClr val="accent1">
+              <a:shade val="50000"/>
+            </a:schemeClr>
+          </a:lnRef>
+          <a:fillRef idx="1">
+            <a:schemeClr val="accent1"/>
+          </a:fillRef>
+          <a:effectRef idx="0">
+            <a:schemeClr val="accent1"/>
+          </a:effectRef>
+          <a:fontRef idx="minor">
+            <a:schemeClr val="lt1"/>
+          </a:fontRef>
+        </p:style>
+        <p:txBody>
+          <a:bodyPr rtlCol="0" anchor="ctr"/>
+          <a:lstStyle/>
+          <a:p>
+            <a:pPr algn="ctr"/>
+            <a:r>
+              <a:rPr lang="en-ZA" sz="4400" b="1" dirty="0">
+                <a:solidFill>
+                  <a:schemeClr val="tx1"/>
+                </a:solidFill>
+                <a:latin typeface="Segoe UI" panose="020B0502040204020203" pitchFamily="34" charset="0"/>
+                <a:cs typeface="Segoe UI" panose="020B0502040204020203" pitchFamily="34" charset="0"/>
+              </a:rPr>
+              <a:t>M</a:t>
+            </a:r>
+          </a:p>
+        </p:txBody>
+      </p:sp>
+      <p:sp>
+        <p:nvSpPr>
+          <p:cNvPr id="82" name="Rectangle 81">
+            <a:extLst>
+              <a:ext uri="{FF2B5EF4-FFF2-40B4-BE49-F238E27FC236}">
+                <a16:creationId xmlns:a16="http://schemas.microsoft.com/office/drawing/2014/main" id="{E1CBAFB3-53D1-4F7A-B92F-0D82ACCD94A6}"/>
+              </a:ext>
+            </a:extLst>
+          </p:cNvPr>
+          <p:cNvSpPr/>
+          <p:nvPr/>
+        </p:nvSpPr>
+        <p:spPr>
+          <a:xfrm>
+            <a:off x="2365846" y="1563945"/>
+            <a:ext cx="647370" cy="597159"/>
+          </a:xfrm>
+          <a:prstGeom prst="rect">
+            <a:avLst/>
+          </a:prstGeom>
+          <a:noFill/>
+          <a:ln w="38100">
+            <a:solidFill>
+              <a:srgbClr val="C0A820"/>
+            </a:solidFill>
+          </a:ln>
+        </p:spPr>
+        <p:style>
+          <a:lnRef idx="2">
+            <a:schemeClr val="accent1">
+              <a:shade val="50000"/>
+            </a:schemeClr>
+          </a:lnRef>
+          <a:fillRef idx="1">
+            <a:schemeClr val="accent1"/>
+          </a:fillRef>
+          <a:effectRef idx="0">
+            <a:schemeClr val="accent1"/>
+          </a:effectRef>
+          <a:fontRef idx="minor">
+            <a:schemeClr val="lt1"/>
+          </a:fontRef>
+        </p:style>
+        <p:txBody>
+          <a:bodyPr rtlCol="0" anchor="ctr"/>
+          <a:lstStyle/>
+          <a:p>
+            <a:pPr algn="ctr"/>
+            <a:r>
+              <a:rPr lang="en-ZA" sz="4400" b="1" dirty="0">
+                <a:solidFill>
+                  <a:schemeClr val="tx1"/>
+                </a:solidFill>
+                <a:latin typeface="Segoe UI" panose="020B0502040204020203" pitchFamily="34" charset="0"/>
+                <a:cs typeface="Segoe UI" panose="020B0502040204020203" pitchFamily="34" charset="0"/>
+              </a:rPr>
+              <a:t>N</a:t>
+            </a:r>
+          </a:p>
+        </p:txBody>
+      </p:sp>
+      <p:cxnSp>
+        <p:nvCxnSpPr>
+          <p:cNvPr id="83" name="Straight Arrow Connector 82">
+            <a:extLst>
+              <a:ext uri="{FF2B5EF4-FFF2-40B4-BE49-F238E27FC236}">
+                <a16:creationId xmlns:a16="http://schemas.microsoft.com/office/drawing/2014/main" id="{FA469AB3-194C-4E2B-9174-2F2278A976D7}"/>
+              </a:ext>
+            </a:extLst>
+          </p:cNvPr>
+          <p:cNvCxnSpPr>
+            <a:cxnSpLocks/>
+            <a:stCxn id="77" idx="3"/>
+          </p:cNvCxnSpPr>
+          <p:nvPr/>
+        </p:nvCxnSpPr>
+        <p:spPr>
+          <a:xfrm>
+            <a:off x="3013216" y="4863873"/>
+            <a:ext cx="443048" cy="0"/>
+          </a:xfrm>
+          <a:prstGeom prst="straightConnector1">
+            <a:avLst/>
+          </a:prstGeom>
+          <a:ln w="38100">
             <a:solidFill>
               <a:srgbClr val="C0A820"/>
             </a:solidFill>
@@ -4774,27 +4734,28 @@
       </p:cxnSp>
       <p:cxnSp>
         <p:nvCxnSpPr>
-          <p:cNvPr id="49" name="Straight Arrow Connector 48">
-            <a:extLst>
-              <a:ext uri="{FF2B5EF4-FFF2-40B4-BE49-F238E27FC236}">
-                <a16:creationId xmlns:a16="http://schemas.microsoft.com/office/drawing/2014/main" id="{C29E867D-50A4-4792-BF67-5E1ED81D892B}"/>
+          <p:cNvPr id="84" name="Straight Arrow Connector 83">
+            <a:extLst>
+              <a:ext uri="{FF2B5EF4-FFF2-40B4-BE49-F238E27FC236}">
+                <a16:creationId xmlns:a16="http://schemas.microsoft.com/office/drawing/2014/main" id="{D2EBE1B5-23D4-46D4-B9E0-F344C47E1E78}"/>
               </a:ext>
             </a:extLst>
           </p:cNvPr>
           <p:cNvCxnSpPr>
             <a:cxnSpLocks/>
+            <a:stCxn id="79" idx="3"/>
           </p:cNvCxnSpPr>
           <p:nvPr/>
         </p:nvCxnSpPr>
         <p:spPr>
-          <a:xfrm flipH="1" flipV="1">
-            <a:off x="6925217" y="4552931"/>
-            <a:ext cx="181080" cy="155180"/>
+          <a:xfrm>
+            <a:off x="3013216" y="4076992"/>
+            <a:ext cx="228459" cy="0"/>
           </a:xfrm>
           <a:prstGeom prst="straightConnector1">
             <a:avLst/>
           </a:prstGeom>
-          <a:ln w="12700">
+          <a:ln w="38100">
             <a:solidFill>
               <a:srgbClr val="C0A820"/>
             </a:solidFill>
@@ -4818,28 +4779,28 @@
       </p:cxnSp>
       <p:cxnSp>
         <p:nvCxnSpPr>
-          <p:cNvPr id="58" name="Straight Arrow Connector 57">
-            <a:extLst>
-              <a:ext uri="{FF2B5EF4-FFF2-40B4-BE49-F238E27FC236}">
-                <a16:creationId xmlns:a16="http://schemas.microsoft.com/office/drawing/2014/main" id="{2655EAC4-0866-46B3-9D82-2759422352F6}"/>
+          <p:cNvPr id="87" name="Straight Arrow Connector 86">
+            <a:extLst>
+              <a:ext uri="{FF2B5EF4-FFF2-40B4-BE49-F238E27FC236}">
+                <a16:creationId xmlns:a16="http://schemas.microsoft.com/office/drawing/2014/main" id="{AFFA662B-57CB-4BEE-A022-09185BBA2031}"/>
               </a:ext>
             </a:extLst>
           </p:cNvPr>
           <p:cNvCxnSpPr>
             <a:cxnSpLocks/>
-            <a:stCxn id="32" idx="1"/>
+            <a:stCxn id="80" idx="3"/>
           </p:cNvCxnSpPr>
           <p:nvPr/>
         </p:nvCxnSpPr>
         <p:spPr>
-          <a:xfrm flipH="1">
-            <a:off x="6925217" y="2562241"/>
-            <a:ext cx="714161" cy="104759"/>
+          <a:xfrm>
+            <a:off x="3013216" y="3285446"/>
+            <a:ext cx="228459" cy="0"/>
           </a:xfrm>
           <a:prstGeom prst="straightConnector1">
             <a:avLst/>
           </a:prstGeom>
-          <a:ln w="12700">
+          <a:ln w="38100">
             <a:solidFill>
               <a:srgbClr val="C0A820"/>
             </a:solidFill>
@@ -4863,27 +4824,28 @@
       </p:cxnSp>
       <p:cxnSp>
         <p:nvCxnSpPr>
-          <p:cNvPr id="66" name="Straight Arrow Connector 65">
-            <a:extLst>
-              <a:ext uri="{FF2B5EF4-FFF2-40B4-BE49-F238E27FC236}">
-                <a16:creationId xmlns:a16="http://schemas.microsoft.com/office/drawing/2014/main" id="{C5A4E214-B940-415F-BB30-11217B34E9C3}"/>
+          <p:cNvPr id="90" name="Straight Arrow Connector 89">
+            <a:extLst>
+              <a:ext uri="{FF2B5EF4-FFF2-40B4-BE49-F238E27FC236}">
+                <a16:creationId xmlns:a16="http://schemas.microsoft.com/office/drawing/2014/main" id="{A68EB1B9-7ABD-4BCB-AB7B-46698697BDD5}"/>
               </a:ext>
             </a:extLst>
           </p:cNvPr>
           <p:cNvCxnSpPr>
             <a:cxnSpLocks/>
+            <a:stCxn id="82" idx="3"/>
           </p:cNvCxnSpPr>
           <p:nvPr/>
         </p:nvCxnSpPr>
         <p:spPr>
           <a:xfrm>
-            <a:off x="4508500" y="2164585"/>
-            <a:ext cx="936625" cy="769115"/>
+            <a:off x="3013216" y="1862525"/>
+            <a:ext cx="355135" cy="0"/>
           </a:xfrm>
           <a:prstGeom prst="straightConnector1">
             <a:avLst/>
           </a:prstGeom>
-          <a:ln w="12700">
+          <a:ln w="38100">
             <a:solidFill>
               <a:srgbClr val="C0A820"/>
             </a:solidFill>
@@ -4905,200 +4867,6 @@
           </a:fontRef>
         </p:style>
       </p:cxnSp>
-      <p:cxnSp>
-        <p:nvCxnSpPr>
-          <p:cNvPr id="75" name="Straight Arrow Connector 74">
-            <a:extLst>
-              <a:ext uri="{FF2B5EF4-FFF2-40B4-BE49-F238E27FC236}">
-                <a16:creationId xmlns:a16="http://schemas.microsoft.com/office/drawing/2014/main" id="{EF5CAA1A-58DD-4F5A-8B6A-EFB2320B1E8E}"/>
-              </a:ext>
-            </a:extLst>
-          </p:cNvPr>
-          <p:cNvCxnSpPr>
-            <a:cxnSpLocks/>
-          </p:cNvCxnSpPr>
-          <p:nvPr/>
-        </p:nvCxnSpPr>
-        <p:spPr>
-          <a:xfrm>
-            <a:off x="5382936" y="2164585"/>
-            <a:ext cx="604322" cy="316678"/>
-          </a:xfrm>
-          <a:prstGeom prst="straightConnector1">
-            <a:avLst/>
-          </a:prstGeom>
-          <a:ln w="12700">
-            <a:solidFill>
-              <a:srgbClr val="C0A820"/>
-            </a:solidFill>
-            <a:tailEnd type="triangle"/>
-          </a:ln>
-        </p:spPr>
-        <p:style>
-          <a:lnRef idx="1">
-            <a:schemeClr val="accent1"/>
-          </a:lnRef>
-          <a:fillRef idx="0">
-            <a:schemeClr val="accent1"/>
-          </a:fillRef>
-          <a:effectRef idx="0">
-            <a:schemeClr val="accent1"/>
-          </a:effectRef>
-          <a:fontRef idx="minor">
-            <a:schemeClr val="tx1"/>
-          </a:fontRef>
-        </p:style>
-      </p:cxnSp>
-      <p:cxnSp>
-        <p:nvCxnSpPr>
-          <p:cNvPr id="78" name="Straight Arrow Connector 77">
-            <a:extLst>
-              <a:ext uri="{FF2B5EF4-FFF2-40B4-BE49-F238E27FC236}">
-                <a16:creationId xmlns:a16="http://schemas.microsoft.com/office/drawing/2014/main" id="{17828947-E833-46F7-BE18-8AAE0D6AF077}"/>
-              </a:ext>
-            </a:extLst>
-          </p:cNvPr>
-          <p:cNvCxnSpPr>
-            <a:cxnSpLocks/>
-            <a:stCxn id="13" idx="2"/>
-          </p:cNvCxnSpPr>
-          <p:nvPr/>
-        </p:nvCxnSpPr>
-        <p:spPr>
-          <a:xfrm>
-            <a:off x="6741977" y="2164583"/>
-            <a:ext cx="4898" cy="130983"/>
-          </a:xfrm>
-          <a:prstGeom prst="straightConnector1">
-            <a:avLst/>
-          </a:prstGeom>
-          <a:ln w="12700">
-            <a:solidFill>
-              <a:srgbClr val="C0A820"/>
-            </a:solidFill>
-            <a:tailEnd type="triangle"/>
-          </a:ln>
-        </p:spPr>
-        <p:style>
-          <a:lnRef idx="1">
-            <a:schemeClr val="accent1"/>
-          </a:lnRef>
-          <a:fillRef idx="0">
-            <a:schemeClr val="accent1"/>
-          </a:fillRef>
-          <a:effectRef idx="0">
-            <a:schemeClr val="accent1"/>
-          </a:effectRef>
-          <a:fontRef idx="minor">
-            <a:schemeClr val="tx1"/>
-          </a:fontRef>
-        </p:style>
-      </p:cxnSp>
-      <p:cxnSp>
-        <p:nvCxnSpPr>
-          <p:cNvPr id="81" name="Straight Arrow Connector 80">
-            <a:extLst>
-              <a:ext uri="{FF2B5EF4-FFF2-40B4-BE49-F238E27FC236}">
-                <a16:creationId xmlns:a16="http://schemas.microsoft.com/office/drawing/2014/main" id="{D2C8B682-89A4-44EF-B838-2439D558722B}"/>
-              </a:ext>
-            </a:extLst>
-          </p:cNvPr>
-          <p:cNvCxnSpPr>
-            <a:cxnSpLocks/>
-          </p:cNvCxnSpPr>
-          <p:nvPr/>
-        </p:nvCxnSpPr>
-        <p:spPr>
-          <a:xfrm flipH="1">
-            <a:off x="7248525" y="2149889"/>
-            <a:ext cx="94684" cy="145677"/>
-          </a:xfrm>
-          <a:prstGeom prst="straightConnector1">
-            <a:avLst/>
-          </a:prstGeom>
-          <a:ln w="12700">
-            <a:solidFill>
-              <a:srgbClr val="C0A820"/>
-            </a:solidFill>
-            <a:tailEnd type="triangle"/>
-          </a:ln>
-        </p:spPr>
-        <p:style>
-          <a:lnRef idx="1">
-            <a:schemeClr val="accent1"/>
-          </a:lnRef>
-          <a:fillRef idx="0">
-            <a:schemeClr val="accent1"/>
-          </a:fillRef>
-          <a:effectRef idx="0">
-            <a:schemeClr val="accent1"/>
-          </a:effectRef>
-          <a:fontRef idx="minor">
-            <a:schemeClr val="tx1"/>
-          </a:fontRef>
-        </p:style>
-      </p:cxnSp>
-      <p:sp>
-        <p:nvSpPr>
-          <p:cNvPr id="32" name="Rectangle 31">
-            <a:extLst>
-              <a:ext uri="{FF2B5EF4-FFF2-40B4-BE49-F238E27FC236}">
-                <a16:creationId xmlns:a16="http://schemas.microsoft.com/office/drawing/2014/main" id="{6034FEE9-674F-42C7-BF70-C3BD04A96059}"/>
-              </a:ext>
-            </a:extLst>
-          </p:cNvPr>
-          <p:cNvSpPr/>
-          <p:nvPr/>
-        </p:nvSpPr>
-        <p:spPr>
-          <a:xfrm>
-            <a:off x="7639378" y="2349585"/>
-            <a:ext cx="1266497" cy="425312"/>
-          </a:xfrm>
-          <a:prstGeom prst="rect">
-            <a:avLst/>
-          </a:prstGeom>
-          <a:noFill/>
-          <a:ln>
-            <a:solidFill>
-              <a:srgbClr val="C0A820"/>
-            </a:solidFill>
-          </a:ln>
-        </p:spPr>
-        <p:style>
-          <a:lnRef idx="2">
-            <a:schemeClr val="accent1">
-              <a:shade val="50000"/>
-            </a:schemeClr>
-          </a:lnRef>
-          <a:fillRef idx="1">
-            <a:schemeClr val="accent1"/>
-          </a:fillRef>
-          <a:effectRef idx="0">
-            <a:schemeClr val="accent1"/>
-          </a:effectRef>
-          <a:fontRef idx="minor">
-            <a:schemeClr val="lt1"/>
-          </a:fontRef>
-        </p:style>
-        <p:txBody>
-          <a:bodyPr rtlCol="0" anchor="ctr"/>
-          <a:lstStyle/>
-          <a:p>
-            <a:pPr algn="ctr"/>
-            <a:r>
-              <a:rPr lang="en-ZA" sz="800" dirty="0">
-                <a:solidFill>
-                  <a:schemeClr val="tx1"/>
-                </a:solidFill>
-                <a:latin typeface="Segoe UI" panose="020B0502040204020203" pitchFamily="34" charset="0"/>
-                <a:cs typeface="Segoe UI" panose="020B0502040204020203" pitchFamily="34" charset="0"/>
-              </a:rPr>
-              <a:t>Standard ARM Cortex debug connector</a:t>
-            </a:r>
-          </a:p>
-        </p:txBody>
-      </p:sp>
     </p:spTree>
     <p:extLst>
       <p:ext uri="{BB962C8B-B14F-4D97-AF65-F5344CB8AC3E}">

</xml_diff>

<commit_message>
Highlight which parts must be hand assembled
</commit_message>
<xml_diff>
--- a/doc/images/hero_board/hero_board_bot_annotated.pptx
+++ b/doc/images/hero_board/hero_board_bot_annotated.pptx
@@ -261,7 +261,7 @@
           <a:p>
             <a:fld id="{A4A54569-7902-4945-B214-29C88B7567F2}" type="datetimeFigureOut">
               <a:rPr lang="en-ZA" smtClean="0"/>
-              <a:t>2020/01/26</a:t>
+              <a:t>2020-05-20</a:t>
             </a:fld>
             <a:endParaRPr lang="en-ZA"/>
           </a:p>
@@ -461,7 +461,7 @@
           <a:p>
             <a:fld id="{A4A54569-7902-4945-B214-29C88B7567F2}" type="datetimeFigureOut">
               <a:rPr lang="en-ZA" smtClean="0"/>
-              <a:t>2020/01/26</a:t>
+              <a:t>2020-05-20</a:t>
             </a:fld>
             <a:endParaRPr lang="en-ZA"/>
           </a:p>
@@ -671,7 +671,7 @@
           <a:p>
             <a:fld id="{A4A54569-7902-4945-B214-29C88B7567F2}" type="datetimeFigureOut">
               <a:rPr lang="en-ZA" smtClean="0"/>
-              <a:t>2020/01/26</a:t>
+              <a:t>2020-05-20</a:t>
             </a:fld>
             <a:endParaRPr lang="en-ZA"/>
           </a:p>
@@ -871,7 +871,7 @@
           <a:p>
             <a:fld id="{A4A54569-7902-4945-B214-29C88B7567F2}" type="datetimeFigureOut">
               <a:rPr lang="en-ZA" smtClean="0"/>
-              <a:t>2020/01/26</a:t>
+              <a:t>2020-05-20</a:t>
             </a:fld>
             <a:endParaRPr lang="en-ZA"/>
           </a:p>
@@ -1147,7 +1147,7 @@
           <a:p>
             <a:fld id="{A4A54569-7902-4945-B214-29C88B7567F2}" type="datetimeFigureOut">
               <a:rPr lang="en-ZA" smtClean="0"/>
-              <a:t>2020/01/26</a:t>
+              <a:t>2020-05-20</a:t>
             </a:fld>
             <a:endParaRPr lang="en-ZA"/>
           </a:p>
@@ -1415,7 +1415,7 @@
           <a:p>
             <a:fld id="{A4A54569-7902-4945-B214-29C88B7567F2}" type="datetimeFigureOut">
               <a:rPr lang="en-ZA" smtClean="0"/>
-              <a:t>2020/01/26</a:t>
+              <a:t>2020-05-20</a:t>
             </a:fld>
             <a:endParaRPr lang="en-ZA"/>
           </a:p>
@@ -1830,7 +1830,7 @@
           <a:p>
             <a:fld id="{A4A54569-7902-4945-B214-29C88B7567F2}" type="datetimeFigureOut">
               <a:rPr lang="en-ZA" smtClean="0"/>
-              <a:t>2020/01/26</a:t>
+              <a:t>2020-05-20</a:t>
             </a:fld>
             <a:endParaRPr lang="en-ZA"/>
           </a:p>
@@ -1972,7 +1972,7 @@
           <a:p>
             <a:fld id="{A4A54569-7902-4945-B214-29C88B7567F2}" type="datetimeFigureOut">
               <a:rPr lang="en-ZA" smtClean="0"/>
-              <a:t>2020/01/26</a:t>
+              <a:t>2020-05-20</a:t>
             </a:fld>
             <a:endParaRPr lang="en-ZA"/>
           </a:p>
@@ -2085,7 +2085,7 @@
           <a:p>
             <a:fld id="{A4A54569-7902-4945-B214-29C88B7567F2}" type="datetimeFigureOut">
               <a:rPr lang="en-ZA" smtClean="0"/>
-              <a:t>2020/01/26</a:t>
+              <a:t>2020-05-20</a:t>
             </a:fld>
             <a:endParaRPr lang="en-ZA"/>
           </a:p>
@@ -2398,7 +2398,7 @@
           <a:p>
             <a:fld id="{A4A54569-7902-4945-B214-29C88B7567F2}" type="datetimeFigureOut">
               <a:rPr lang="en-ZA" smtClean="0"/>
-              <a:t>2020/01/26</a:t>
+              <a:t>2020-05-20</a:t>
             </a:fld>
             <a:endParaRPr lang="en-ZA"/>
           </a:p>
@@ -2687,7 +2687,7 @@
           <a:p>
             <a:fld id="{A4A54569-7902-4945-B214-29C88B7567F2}" type="datetimeFigureOut">
               <a:rPr lang="en-ZA" smtClean="0"/>
-              <a:t>2020/01/26</a:t>
+              <a:t>2020-05-20</a:t>
             </a:fld>
             <a:endParaRPr lang="en-ZA"/>
           </a:p>
@@ -2930,7 +2930,7 @@
           <a:p>
             <a:fld id="{A4A54569-7902-4945-B214-29C88B7567F2}" type="datetimeFigureOut">
               <a:rPr lang="en-ZA" smtClean="0"/>
-              <a:t>2020/01/26</a:t>
+              <a:t>2020-05-20</a:t>
             </a:fld>
             <a:endParaRPr lang="en-ZA"/>
           </a:p>
@@ -3564,7 +3564,7 @@
         </p:nvSpPr>
         <p:spPr>
           <a:xfrm>
-            <a:off x="6419685" y="347533"/>
+            <a:off x="6408731" y="358953"/>
             <a:ext cx="647370" cy="597159"/>
           </a:xfrm>
           <a:prstGeom prst="rect">
@@ -3628,7 +3628,7 @@
         </p:nvCxnSpPr>
         <p:spPr>
           <a:xfrm>
-            <a:off x="6743370" y="944692"/>
+            <a:off x="6732416" y="956112"/>
             <a:ext cx="43260" cy="259411"/>
           </a:xfrm>
           <a:prstGeom prst="straightConnector1">
@@ -3670,7 +3670,7 @@
         </p:nvSpPr>
         <p:spPr>
           <a:xfrm>
-            <a:off x="7309669" y="340405"/>
+            <a:off x="7304143" y="358354"/>
             <a:ext cx="647370" cy="597159"/>
           </a:xfrm>
           <a:prstGeom prst="rect">
@@ -3731,7 +3731,7 @@
         </p:nvSpPr>
         <p:spPr>
           <a:xfrm>
-            <a:off x="8205179" y="344228"/>
+            <a:off x="8182651" y="358354"/>
             <a:ext cx="647370" cy="597159"/>
           </a:xfrm>
           <a:prstGeom prst="rect">
@@ -3920,7 +3920,11 @@
           <a:prstGeom prst="rect">
             <a:avLst/>
           </a:prstGeom>
-          <a:noFill/>
+          <a:solidFill>
+            <a:srgbClr val="FFFF00">
+              <a:alpha val="25000"/>
+            </a:srgbClr>
+          </a:solidFill>
           <a:ln w="38100">
             <a:solidFill>
               <a:srgbClr val="C0A820"/>
@@ -3978,7 +3982,7 @@
         </p:nvCxnSpPr>
         <p:spPr>
           <a:xfrm flipH="1">
-            <a:off x="7498668" y="937564"/>
+            <a:off x="7493142" y="955513"/>
             <a:ext cx="134686" cy="266539"/>
           </a:xfrm>
           <a:prstGeom prst="straightConnector1">
@@ -4023,7 +4027,7 @@
         </p:nvCxnSpPr>
         <p:spPr>
           <a:xfrm flipH="1">
-            <a:off x="8275198" y="941387"/>
+            <a:off x="8252670" y="955513"/>
             <a:ext cx="253666" cy="259411"/>
           </a:xfrm>
           <a:prstGeom prst="straightConnector1">
@@ -4251,7 +4255,11 @@
           <a:prstGeom prst="rect">
             <a:avLst/>
           </a:prstGeom>
-          <a:noFill/>
+          <a:solidFill>
+            <a:srgbClr val="FFFF00">
+              <a:alpha val="25000"/>
+            </a:srgbClr>
+          </a:solidFill>
           <a:ln w="38100">
             <a:solidFill>
               <a:srgbClr val="C0A820"/>
@@ -4646,7 +4654,11 @@
           <a:prstGeom prst="rect">
             <a:avLst/>
           </a:prstGeom>
-          <a:noFill/>
+          <a:solidFill>
+            <a:srgbClr val="FFFF00">
+              <a:alpha val="25000"/>
+            </a:srgbClr>
+          </a:solidFill>
           <a:ln w="38100">
             <a:solidFill>
               <a:srgbClr val="C0A820"/>

</xml_diff>